<commit_message>
LineAndDetector module diagram added
</commit_message>
<xml_diff>
--- a/img/moudle diagram.pptx
+++ b/img/moudle diagram.pptx
@@ -6,9 +6,11 @@
   </p:sldMasterIdLst>
   <p:sldIdLst>
     <p:sldId id="256" r:id="rId2"/>
-    <p:sldId id="257" r:id="rId3"/>
+    <p:sldId id="260" r:id="rId3"/>
     <p:sldId id="258" r:id="rId4"/>
     <p:sldId id="259" r:id="rId5"/>
+    <p:sldId id="262" r:id="rId6"/>
+    <p:sldId id="261" r:id="rId7"/>
   </p:sldIdLst>
   <p:sldSz cx="12192000" cy="6858000"/>
   <p:notesSz cx="6858000" cy="9144000"/>
@@ -262,7 +264,7 @@
           <a:p>
             <a:fld id="{5E521124-23D1-4001-AB4C-DEA3B120BF7E}" type="datetimeFigureOut">
               <a:rPr lang="ko-KR" altLang="en-US" smtClean="0"/>
-              <a:t>2019-05-27</a:t>
+              <a:t>2019-05-28</a:t>
             </a:fld>
             <a:endParaRPr lang="ko-KR" altLang="en-US"/>
           </a:p>
@@ -460,7 +462,7 @@
           <a:p>
             <a:fld id="{5E521124-23D1-4001-AB4C-DEA3B120BF7E}" type="datetimeFigureOut">
               <a:rPr lang="ko-KR" altLang="en-US" smtClean="0"/>
-              <a:t>2019-05-27</a:t>
+              <a:t>2019-05-28</a:t>
             </a:fld>
             <a:endParaRPr lang="ko-KR" altLang="en-US"/>
           </a:p>
@@ -668,7 +670,7 @@
           <a:p>
             <a:fld id="{5E521124-23D1-4001-AB4C-DEA3B120BF7E}" type="datetimeFigureOut">
               <a:rPr lang="ko-KR" altLang="en-US" smtClean="0"/>
-              <a:t>2019-05-27</a:t>
+              <a:t>2019-05-28</a:t>
             </a:fld>
             <a:endParaRPr lang="ko-KR" altLang="en-US"/>
           </a:p>
@@ -866,7 +868,7 @@
           <a:p>
             <a:fld id="{5E521124-23D1-4001-AB4C-DEA3B120BF7E}" type="datetimeFigureOut">
               <a:rPr lang="ko-KR" altLang="en-US" smtClean="0"/>
-              <a:t>2019-05-27</a:t>
+              <a:t>2019-05-28</a:t>
             </a:fld>
             <a:endParaRPr lang="ko-KR" altLang="en-US"/>
           </a:p>
@@ -1141,7 +1143,7 @@
           <a:p>
             <a:fld id="{5E521124-23D1-4001-AB4C-DEA3B120BF7E}" type="datetimeFigureOut">
               <a:rPr lang="ko-KR" altLang="en-US" smtClean="0"/>
-              <a:t>2019-05-27</a:t>
+              <a:t>2019-05-28</a:t>
             </a:fld>
             <a:endParaRPr lang="ko-KR" altLang="en-US"/>
           </a:p>
@@ -1406,7 +1408,7 @@
           <a:p>
             <a:fld id="{5E521124-23D1-4001-AB4C-DEA3B120BF7E}" type="datetimeFigureOut">
               <a:rPr lang="ko-KR" altLang="en-US" smtClean="0"/>
-              <a:t>2019-05-27</a:t>
+              <a:t>2019-05-28</a:t>
             </a:fld>
             <a:endParaRPr lang="ko-KR" altLang="en-US"/>
           </a:p>
@@ -1818,7 +1820,7 @@
           <a:p>
             <a:fld id="{5E521124-23D1-4001-AB4C-DEA3B120BF7E}" type="datetimeFigureOut">
               <a:rPr lang="ko-KR" altLang="en-US" smtClean="0"/>
-              <a:t>2019-05-27</a:t>
+              <a:t>2019-05-28</a:t>
             </a:fld>
             <a:endParaRPr lang="ko-KR" altLang="en-US"/>
           </a:p>
@@ -1959,7 +1961,7 @@
           <a:p>
             <a:fld id="{5E521124-23D1-4001-AB4C-DEA3B120BF7E}" type="datetimeFigureOut">
               <a:rPr lang="ko-KR" altLang="en-US" smtClean="0"/>
-              <a:t>2019-05-27</a:t>
+              <a:t>2019-05-28</a:t>
             </a:fld>
             <a:endParaRPr lang="ko-KR" altLang="en-US"/>
           </a:p>
@@ -2072,7 +2074,7 @@
           <a:p>
             <a:fld id="{5E521124-23D1-4001-AB4C-DEA3B120BF7E}" type="datetimeFigureOut">
               <a:rPr lang="ko-KR" altLang="en-US" smtClean="0"/>
-              <a:t>2019-05-27</a:t>
+              <a:t>2019-05-28</a:t>
             </a:fld>
             <a:endParaRPr lang="ko-KR" altLang="en-US"/>
           </a:p>
@@ -2383,7 +2385,7 @@
           <a:p>
             <a:fld id="{5E521124-23D1-4001-AB4C-DEA3B120BF7E}" type="datetimeFigureOut">
               <a:rPr lang="ko-KR" altLang="en-US" smtClean="0"/>
-              <a:t>2019-05-27</a:t>
+              <a:t>2019-05-28</a:t>
             </a:fld>
             <a:endParaRPr lang="ko-KR" altLang="en-US"/>
           </a:p>
@@ -2671,7 +2673,7 @@
           <a:p>
             <a:fld id="{5E521124-23D1-4001-AB4C-DEA3B120BF7E}" type="datetimeFigureOut">
               <a:rPr lang="ko-KR" altLang="en-US" smtClean="0"/>
-              <a:t>2019-05-27</a:t>
+              <a:t>2019-05-28</a:t>
             </a:fld>
             <a:endParaRPr lang="ko-KR" altLang="en-US"/>
           </a:p>
@@ -2912,7 +2914,7 @@
           <a:p>
             <a:fld id="{5E521124-23D1-4001-AB4C-DEA3B120BF7E}" type="datetimeFigureOut">
               <a:rPr lang="ko-KR" altLang="en-US" smtClean="0"/>
-              <a:t>2019-05-27</a:t>
+              <a:t>2019-05-28</a:t>
             </a:fld>
             <a:endParaRPr lang="ko-KR" altLang="en-US"/>
           </a:p>
@@ -4524,10 +4526,10 @@
       </p:grpSpPr>
       <p:grpSp>
         <p:nvGrpSpPr>
-          <p:cNvPr id="13" name="그룹 12">
+          <p:cNvPr id="50" name="그룹 49">
             <a:extLst>
               <a:ext uri="{FF2B5EF4-FFF2-40B4-BE49-F238E27FC236}">
-                <a16:creationId xmlns:a16="http://schemas.microsoft.com/office/drawing/2014/main" id="{E9894606-F451-411A-9808-24B484D6B1B2}"/>
+                <a16:creationId xmlns:a16="http://schemas.microsoft.com/office/drawing/2014/main" id="{9686FEF8-315C-4DC1-A06B-B0E18C3E5006}"/>
               </a:ext>
             </a:extLst>
           </p:cNvPr>
@@ -4536,18 +4538,18 @@
         </p:nvGrpSpPr>
         <p:grpSpPr>
           <a:xfrm>
-            <a:off x="2154429" y="1517775"/>
-            <a:ext cx="6884045" cy="1821532"/>
-            <a:chOff x="2154429" y="1517775"/>
-            <a:chExt cx="6884045" cy="1821532"/>
+            <a:off x="2394000" y="1722731"/>
+            <a:ext cx="6890456" cy="2509459"/>
+            <a:chOff x="2465718" y="2368189"/>
+            <a:chExt cx="6890456" cy="2509459"/>
           </a:xfrm>
         </p:grpSpPr>
         <p:sp>
           <p:nvSpPr>
-            <p:cNvPr id="4" name="직사각형 3">
+            <p:cNvPr id="5" name="직사각형 4">
               <a:extLst>
                 <a:ext uri="{FF2B5EF4-FFF2-40B4-BE49-F238E27FC236}">
-                  <a16:creationId xmlns:a16="http://schemas.microsoft.com/office/drawing/2014/main" id="{5C039994-80EF-43E3-A9ED-524C292EB61D}"/>
+                  <a16:creationId xmlns:a16="http://schemas.microsoft.com/office/drawing/2014/main" id="{B2295775-CFA9-42DF-A8C1-823D0CCE0A49}"/>
                 </a:ext>
               </a:extLst>
             </p:cNvPr>
@@ -4556,7 +4558,7 @@
           </p:nvSpPr>
           <p:spPr>
             <a:xfrm>
-              <a:off x="4652263" y="1898089"/>
+              <a:off x="4963552" y="3436430"/>
               <a:ext cx="1938075" cy="1118120"/>
             </a:xfrm>
             <a:prstGeom prst="rect">
@@ -4596,10 +4598,10 @@
         </p:sp>
         <p:cxnSp>
           <p:nvCxnSpPr>
-            <p:cNvPr id="5" name="직선 화살표 연결선 4">
+            <p:cNvPr id="6" name="직선 화살표 연결선 5">
               <a:extLst>
                 <a:ext uri="{FF2B5EF4-FFF2-40B4-BE49-F238E27FC236}">
-                  <a16:creationId xmlns:a16="http://schemas.microsoft.com/office/drawing/2014/main" id="{7FB368C6-9DDF-414E-903E-5F8A301BB514}"/>
+                  <a16:creationId xmlns:a16="http://schemas.microsoft.com/office/drawing/2014/main" id="{D6F6C469-0FDA-439D-9B10-4D283AD6355B}"/>
                 </a:ext>
               </a:extLst>
             </p:cNvPr>
@@ -4608,7 +4610,7 @@
           </p:nvCxnSpPr>
           <p:spPr>
             <a:xfrm flipH="1">
-              <a:off x="6590338" y="2226316"/>
+              <a:off x="6901627" y="3764657"/>
               <a:ext cx="1633491" cy="0"/>
             </a:xfrm>
             <a:prstGeom prst="straightConnector1">
@@ -4638,10 +4640,10 @@
         </p:cxnSp>
         <p:sp>
           <p:nvSpPr>
-            <p:cNvPr id="6" name="TextBox 5">
+            <p:cNvPr id="7" name="TextBox 6">
               <a:extLst>
                 <a:ext uri="{FF2B5EF4-FFF2-40B4-BE49-F238E27FC236}">
-                  <a16:creationId xmlns:a16="http://schemas.microsoft.com/office/drawing/2014/main" id="{B3BB1041-B08F-496E-8AE5-C836EA5F92F4}"/>
+                  <a16:creationId xmlns:a16="http://schemas.microsoft.com/office/drawing/2014/main" id="{13AE919B-EDD7-41A2-A60E-CA09E0CF7EC4}"/>
                 </a:ext>
               </a:extLst>
             </p:cNvPr>
@@ -4650,7 +4652,7 @@
           </p:nvSpPr>
           <p:spPr>
             <a:xfrm>
-              <a:off x="5095015" y="2226316"/>
+              <a:off x="5406304" y="3764657"/>
               <a:ext cx="1052570" cy="461665"/>
             </a:xfrm>
             <a:prstGeom prst="rect">
@@ -4675,10 +4677,10 @@
         </p:sp>
         <p:cxnSp>
           <p:nvCxnSpPr>
-            <p:cNvPr id="7" name="직선 화살표 연결선 6">
+            <p:cNvPr id="8" name="직선 화살표 연결선 7">
               <a:extLst>
                 <a:ext uri="{FF2B5EF4-FFF2-40B4-BE49-F238E27FC236}">
-                  <a16:creationId xmlns:a16="http://schemas.microsoft.com/office/drawing/2014/main" id="{EEF9C63C-7106-45ED-A529-0649D2E882D0}"/>
+                  <a16:creationId xmlns:a16="http://schemas.microsoft.com/office/drawing/2014/main" id="{F22ECCEA-BFAE-4537-B3BC-1D1627A7F586}"/>
                 </a:ext>
               </a:extLst>
             </p:cNvPr>
@@ -4687,7 +4689,7 @@
           </p:nvCxnSpPr>
           <p:spPr>
             <a:xfrm flipH="1">
-              <a:off x="6590337" y="2461753"/>
+              <a:off x="6901626" y="4000094"/>
               <a:ext cx="1633491" cy="0"/>
             </a:xfrm>
             <a:prstGeom prst="straightConnector1">
@@ -4717,10 +4719,10 @@
         </p:cxnSp>
         <p:cxnSp>
           <p:nvCxnSpPr>
-            <p:cNvPr id="8" name="직선 화살표 연결선 7">
+            <p:cNvPr id="9" name="직선 화살표 연결선 8">
               <a:extLst>
                 <a:ext uri="{FF2B5EF4-FFF2-40B4-BE49-F238E27FC236}">
-                  <a16:creationId xmlns:a16="http://schemas.microsoft.com/office/drawing/2014/main" id="{B0B7E7AB-66EE-441F-9311-BFA70E1986B6}"/>
+                  <a16:creationId xmlns:a16="http://schemas.microsoft.com/office/drawing/2014/main" id="{84A9BF5F-8314-439E-8A13-22A7752F02C0}"/>
                 </a:ext>
               </a:extLst>
             </p:cNvPr>
@@ -4729,7 +4731,7 @@
           </p:nvCxnSpPr>
           <p:spPr>
             <a:xfrm flipH="1">
-              <a:off x="6590336" y="2687981"/>
+              <a:off x="6901625" y="4226322"/>
               <a:ext cx="1633491" cy="0"/>
             </a:xfrm>
             <a:prstGeom prst="straightConnector1">
@@ -4759,10 +4761,10 @@
         </p:cxnSp>
         <p:sp>
           <p:nvSpPr>
-            <p:cNvPr id="16" name="TextBox 15">
+            <p:cNvPr id="10" name="TextBox 9">
               <a:extLst>
                 <a:ext uri="{FF2B5EF4-FFF2-40B4-BE49-F238E27FC236}">
-                  <a16:creationId xmlns:a16="http://schemas.microsoft.com/office/drawing/2014/main" id="{7EC537F3-D041-427C-8900-3A27846A2B16}"/>
+                  <a16:creationId xmlns:a16="http://schemas.microsoft.com/office/drawing/2014/main" id="{980667EC-ACFB-410F-95A8-A220418229D5}"/>
                 </a:ext>
               </a:extLst>
             </p:cNvPr>
@@ -4771,7 +4773,7 @@
           </p:nvSpPr>
           <p:spPr>
             <a:xfrm>
-              <a:off x="8223827" y="2092422"/>
+              <a:off x="8535116" y="3630763"/>
               <a:ext cx="814647" cy="276999"/>
             </a:xfrm>
             <a:prstGeom prst="rect">
@@ -4795,10 +4797,10 @@
         </p:sp>
         <p:sp>
           <p:nvSpPr>
-            <p:cNvPr id="22" name="TextBox 21">
+            <p:cNvPr id="11" name="TextBox 10">
               <a:extLst>
                 <a:ext uri="{FF2B5EF4-FFF2-40B4-BE49-F238E27FC236}">
-                  <a16:creationId xmlns:a16="http://schemas.microsoft.com/office/drawing/2014/main" id="{EA333144-68B8-489B-B086-81F0716FB987}"/>
+                  <a16:creationId xmlns:a16="http://schemas.microsoft.com/office/drawing/2014/main" id="{AEF70ACD-3B72-46DC-9971-B1E6F5FCCDD3}"/>
                 </a:ext>
               </a:extLst>
             </p:cNvPr>
@@ -4807,7 +4809,7 @@
           </p:nvSpPr>
           <p:spPr>
             <a:xfrm>
-              <a:off x="8223827" y="2314044"/>
+              <a:off x="8535116" y="3852385"/>
               <a:ext cx="814647" cy="276999"/>
             </a:xfrm>
             <a:prstGeom prst="rect">
@@ -4831,10 +4833,10 @@
         </p:sp>
         <p:sp>
           <p:nvSpPr>
-            <p:cNvPr id="23" name="TextBox 22">
+            <p:cNvPr id="12" name="TextBox 11">
               <a:extLst>
                 <a:ext uri="{FF2B5EF4-FFF2-40B4-BE49-F238E27FC236}">
-                  <a16:creationId xmlns:a16="http://schemas.microsoft.com/office/drawing/2014/main" id="{1979A7FE-0AC9-4EEA-A945-E689782E7B8B}"/>
+                  <a16:creationId xmlns:a16="http://schemas.microsoft.com/office/drawing/2014/main" id="{BE5D4894-C676-4422-AB77-4A8DA5EC403B}"/>
                 </a:ext>
               </a:extLst>
             </p:cNvPr>
@@ -4843,7 +4845,7 @@
           </p:nvSpPr>
           <p:spPr>
             <a:xfrm>
-              <a:off x="8223826" y="2554086"/>
+              <a:off x="8535115" y="4092427"/>
               <a:ext cx="814647" cy="276999"/>
             </a:xfrm>
             <a:prstGeom prst="rect">
@@ -4867,10 +4869,10 @@
         </p:sp>
         <p:sp>
           <p:nvSpPr>
-            <p:cNvPr id="29" name="이등변 삼각형 28">
+            <p:cNvPr id="13" name="이등변 삼각형 12">
               <a:extLst>
                 <a:ext uri="{FF2B5EF4-FFF2-40B4-BE49-F238E27FC236}">
-                  <a16:creationId xmlns:a16="http://schemas.microsoft.com/office/drawing/2014/main" id="{D325DAFE-692C-4907-A1E5-B99657405D62}"/>
+                  <a16:creationId xmlns:a16="http://schemas.microsoft.com/office/drawing/2014/main" id="{594D4047-258A-40C2-8A20-997034925B4C}"/>
                 </a:ext>
               </a:extLst>
             </p:cNvPr>
@@ -4879,7 +4881,7 @@
           </p:nvSpPr>
           <p:spPr>
             <a:xfrm>
-              <a:off x="5460899" y="2739654"/>
+              <a:off x="5772188" y="4277995"/>
               <a:ext cx="320802" cy="276554"/>
             </a:xfrm>
             <a:prstGeom prst="triangle">
@@ -4919,23 +4921,23 @@
         </p:sp>
         <p:cxnSp>
           <p:nvCxnSpPr>
-            <p:cNvPr id="31" name="연결선: 꺾임 30">
+            <p:cNvPr id="14" name="연결선: 꺾임 13">
               <a:extLst>
                 <a:ext uri="{FF2B5EF4-FFF2-40B4-BE49-F238E27FC236}">
-                  <a16:creationId xmlns:a16="http://schemas.microsoft.com/office/drawing/2014/main" id="{15C34574-B543-4D98-B4C4-7DA91DDDDED1}"/>
+                  <a16:creationId xmlns:a16="http://schemas.microsoft.com/office/drawing/2014/main" id="{F1EB4FF6-9564-4DF5-AB1D-35F5FF21DA21}"/>
                 </a:ext>
               </a:extLst>
             </p:cNvPr>
             <p:cNvCxnSpPr>
               <a:cxnSpLocks/>
-              <a:stCxn id="29" idx="3"/>
-              <a:endCxn id="34" idx="1"/>
+              <a:stCxn id="13" idx="3"/>
+              <a:endCxn id="15" idx="1"/>
             </p:cNvCxnSpPr>
             <p:nvPr/>
           </p:nvCxnSpPr>
           <p:spPr>
             <a:xfrm rot="16200000" flipH="1">
-              <a:off x="6830262" y="1807245"/>
+              <a:off x="7141551" y="3345586"/>
               <a:ext cx="184600" cy="2602525"/>
             </a:xfrm>
             <a:prstGeom prst="bentConnector2">
@@ -4966,10 +4968,10 @@
         </p:cxnSp>
         <p:sp>
           <p:nvSpPr>
-            <p:cNvPr id="34" name="TextBox 33">
+            <p:cNvPr id="15" name="TextBox 14">
               <a:extLst>
                 <a:ext uri="{FF2B5EF4-FFF2-40B4-BE49-F238E27FC236}">
-                  <a16:creationId xmlns:a16="http://schemas.microsoft.com/office/drawing/2014/main" id="{26216780-68FC-49F3-8827-BE0E58D01078}"/>
+                  <a16:creationId xmlns:a16="http://schemas.microsoft.com/office/drawing/2014/main" id="{6BC706F4-1CA5-4109-B476-5ECE21735BFF}"/>
                 </a:ext>
               </a:extLst>
             </p:cNvPr>
@@ -4978,7 +4980,7 @@
           </p:nvSpPr>
           <p:spPr>
             <a:xfrm>
-              <a:off x="8223825" y="3062308"/>
+              <a:off x="8535114" y="4600649"/>
               <a:ext cx="538930" cy="276999"/>
             </a:xfrm>
             <a:prstGeom prst="rect">
@@ -5002,10 +5004,10 @@
         </p:sp>
         <p:grpSp>
           <p:nvGrpSpPr>
-            <p:cNvPr id="37" name="그룹 36">
+            <p:cNvPr id="16" name="그룹 15">
               <a:extLst>
                 <a:ext uri="{FF2B5EF4-FFF2-40B4-BE49-F238E27FC236}">
-                  <a16:creationId xmlns:a16="http://schemas.microsoft.com/office/drawing/2014/main" id="{9A0973AE-F648-4E27-A4B4-321740900CAF}"/>
+                  <a16:creationId xmlns:a16="http://schemas.microsoft.com/office/drawing/2014/main" id="{F41DC55A-A71E-42AF-BC3D-64BDAD8DEE9D}"/>
                 </a:ext>
               </a:extLst>
             </p:cNvPr>
@@ -5014,7 +5016,7 @@
           </p:nvGrpSpPr>
           <p:grpSpPr>
             <a:xfrm>
-              <a:off x="2154429" y="2017304"/>
+              <a:off x="2465718" y="3555645"/>
               <a:ext cx="2497832" cy="276998"/>
               <a:chOff x="828551" y="1862829"/>
               <a:chExt cx="2497832" cy="276998"/>
@@ -5022,10 +5024,10 @@
           </p:grpSpPr>
           <p:cxnSp>
             <p:nvCxnSpPr>
-              <p:cNvPr id="38" name="직선 화살표 연결선 37">
+              <p:cNvPr id="27" name="직선 화살표 연결선 26">
                 <a:extLst>
                   <a:ext uri="{FF2B5EF4-FFF2-40B4-BE49-F238E27FC236}">
-                    <a16:creationId xmlns:a16="http://schemas.microsoft.com/office/drawing/2014/main" id="{AB8E130D-B9AA-46CB-8056-5C254ECD29D7}"/>
+                    <a16:creationId xmlns:a16="http://schemas.microsoft.com/office/drawing/2014/main" id="{E1C83047-E2C9-4D31-8965-DA84042048F1}"/>
                   </a:ext>
                 </a:extLst>
               </p:cNvPr>
@@ -5064,10 +5066,10 @@
           </p:cxnSp>
           <p:sp>
             <p:nvSpPr>
-              <p:cNvPr id="39" name="TextBox 38">
+              <p:cNvPr id="28" name="TextBox 27">
                 <a:extLst>
                   <a:ext uri="{FF2B5EF4-FFF2-40B4-BE49-F238E27FC236}">
-                    <a16:creationId xmlns:a16="http://schemas.microsoft.com/office/drawing/2014/main" id="{C83ECACE-5A2D-47CA-9258-4F1C83F20C62}"/>
+                    <a16:creationId xmlns:a16="http://schemas.microsoft.com/office/drawing/2014/main" id="{F265217E-935A-4632-8BBE-84182AC497A9}"/>
                   </a:ext>
                 </a:extLst>
               </p:cNvPr>
@@ -5100,10 +5102,10 @@
           </p:sp>
           <p:cxnSp>
             <p:nvCxnSpPr>
-              <p:cNvPr id="40" name="직선 연결선 39">
+              <p:cNvPr id="29" name="직선 연결선 28">
                 <a:extLst>
                   <a:ext uri="{FF2B5EF4-FFF2-40B4-BE49-F238E27FC236}">
-                    <a16:creationId xmlns:a16="http://schemas.microsoft.com/office/drawing/2014/main" id="{21C593D5-F2C8-45F0-A3BC-431419FD5427}"/>
+                    <a16:creationId xmlns:a16="http://schemas.microsoft.com/office/drawing/2014/main" id="{5802C079-1FF6-4839-B552-DD5DB02B1BB4}"/>
                   </a:ext>
                 </a:extLst>
               </p:cNvPr>
@@ -5144,10 +5146,10 @@
         </p:grpSp>
         <p:grpSp>
           <p:nvGrpSpPr>
-            <p:cNvPr id="41" name="그룹 40">
+            <p:cNvPr id="17" name="그룹 16">
               <a:extLst>
                 <a:ext uri="{FF2B5EF4-FFF2-40B4-BE49-F238E27FC236}">
-                  <a16:creationId xmlns:a16="http://schemas.microsoft.com/office/drawing/2014/main" id="{B0F0F26D-14B7-4901-A6A3-333F14A81802}"/>
+                  <a16:creationId xmlns:a16="http://schemas.microsoft.com/office/drawing/2014/main" id="{5D170498-8E9C-472C-9849-1A11B2AE770D}"/>
                 </a:ext>
               </a:extLst>
             </p:cNvPr>
@@ -5156,7 +5158,7 @@
           </p:nvGrpSpPr>
           <p:grpSpPr>
             <a:xfrm>
-              <a:off x="2154429" y="2271917"/>
+              <a:off x="2465718" y="3810258"/>
               <a:ext cx="2497832" cy="276998"/>
               <a:chOff x="828551" y="1862829"/>
               <a:chExt cx="2497832" cy="276998"/>
@@ -5164,10 +5166,10 @@
           </p:grpSpPr>
           <p:cxnSp>
             <p:nvCxnSpPr>
-              <p:cNvPr id="42" name="직선 화살표 연결선 41">
+              <p:cNvPr id="24" name="직선 화살표 연결선 23">
                 <a:extLst>
                   <a:ext uri="{FF2B5EF4-FFF2-40B4-BE49-F238E27FC236}">
-                    <a16:creationId xmlns:a16="http://schemas.microsoft.com/office/drawing/2014/main" id="{942FB6F8-23FD-46EA-B6B1-DE5971CD849A}"/>
+                    <a16:creationId xmlns:a16="http://schemas.microsoft.com/office/drawing/2014/main" id="{456D6088-08D4-4157-9E34-C3EC9FE64B1F}"/>
                   </a:ext>
                 </a:extLst>
               </p:cNvPr>
@@ -5206,10 +5208,10 @@
           </p:cxnSp>
           <p:sp>
             <p:nvSpPr>
-              <p:cNvPr id="43" name="TextBox 42">
+              <p:cNvPr id="25" name="TextBox 24">
                 <a:extLst>
                   <a:ext uri="{FF2B5EF4-FFF2-40B4-BE49-F238E27FC236}">
-                    <a16:creationId xmlns:a16="http://schemas.microsoft.com/office/drawing/2014/main" id="{5DC7E1F9-5F47-4E94-9DCA-143991E8AB2E}"/>
+                    <a16:creationId xmlns:a16="http://schemas.microsoft.com/office/drawing/2014/main" id="{FC8028D8-A94A-4554-BA4E-C1D064648F22}"/>
                   </a:ext>
                 </a:extLst>
               </p:cNvPr>
@@ -5242,10 +5244,10 @@
           </p:sp>
           <p:cxnSp>
             <p:nvCxnSpPr>
-              <p:cNvPr id="44" name="직선 연결선 43">
+              <p:cNvPr id="26" name="직선 연결선 25">
                 <a:extLst>
                   <a:ext uri="{FF2B5EF4-FFF2-40B4-BE49-F238E27FC236}">
-                    <a16:creationId xmlns:a16="http://schemas.microsoft.com/office/drawing/2014/main" id="{DA2B3AC2-3BC1-489D-8C40-63FA0DFCE738}"/>
+                    <a16:creationId xmlns:a16="http://schemas.microsoft.com/office/drawing/2014/main" id="{5D6844B6-F05A-4637-9014-C113038D54EA}"/>
                   </a:ext>
                 </a:extLst>
               </p:cNvPr>
@@ -5286,10 +5288,10 @@
         </p:grpSp>
         <p:grpSp>
           <p:nvGrpSpPr>
-            <p:cNvPr id="45" name="그룹 44">
+            <p:cNvPr id="18" name="그룹 17">
               <a:extLst>
                 <a:ext uri="{FF2B5EF4-FFF2-40B4-BE49-F238E27FC236}">
-                  <a16:creationId xmlns:a16="http://schemas.microsoft.com/office/drawing/2014/main" id="{B542A94C-681C-4E6E-926C-41836DDD6512}"/>
+                  <a16:creationId xmlns:a16="http://schemas.microsoft.com/office/drawing/2014/main" id="{588B39BD-CA5D-49F7-B07F-7F6F489BAA4F}"/>
                 </a:ext>
               </a:extLst>
             </p:cNvPr>
@@ -5298,7 +5300,7 @@
           </p:nvGrpSpPr>
           <p:grpSpPr>
             <a:xfrm>
-              <a:off x="2154430" y="2526531"/>
+              <a:off x="2465719" y="4064872"/>
               <a:ext cx="2497832" cy="276998"/>
               <a:chOff x="828551" y="1862829"/>
               <a:chExt cx="2497832" cy="276998"/>
@@ -5306,10 +5308,10 @@
           </p:grpSpPr>
           <p:cxnSp>
             <p:nvCxnSpPr>
-              <p:cNvPr id="46" name="직선 화살표 연결선 45">
+              <p:cNvPr id="21" name="직선 화살표 연결선 20">
                 <a:extLst>
                   <a:ext uri="{FF2B5EF4-FFF2-40B4-BE49-F238E27FC236}">
-                    <a16:creationId xmlns:a16="http://schemas.microsoft.com/office/drawing/2014/main" id="{DB9FAD11-BCAD-4633-AE90-97321583A8B9}"/>
+                    <a16:creationId xmlns:a16="http://schemas.microsoft.com/office/drawing/2014/main" id="{9E9F4C63-F89F-4BC2-8078-71F7A45144A1}"/>
                   </a:ext>
                 </a:extLst>
               </p:cNvPr>
@@ -5348,10 +5350,10 @@
           </p:cxnSp>
           <p:sp>
             <p:nvSpPr>
-              <p:cNvPr id="47" name="TextBox 46">
+              <p:cNvPr id="22" name="TextBox 21">
                 <a:extLst>
                   <a:ext uri="{FF2B5EF4-FFF2-40B4-BE49-F238E27FC236}">
-                    <a16:creationId xmlns:a16="http://schemas.microsoft.com/office/drawing/2014/main" id="{6F04D1CD-0CF9-4DE9-8F80-F97ACC817F24}"/>
+                    <a16:creationId xmlns:a16="http://schemas.microsoft.com/office/drawing/2014/main" id="{122F0E0F-7DDB-4BC9-B74D-5AA834A31CEA}"/>
                   </a:ext>
                 </a:extLst>
               </p:cNvPr>
@@ -5384,10 +5386,10 @@
           </p:sp>
           <p:cxnSp>
             <p:nvCxnSpPr>
-              <p:cNvPr id="48" name="직선 연결선 47">
+              <p:cNvPr id="23" name="직선 연결선 22">
                 <a:extLst>
                   <a:ext uri="{FF2B5EF4-FFF2-40B4-BE49-F238E27FC236}">
-                    <a16:creationId xmlns:a16="http://schemas.microsoft.com/office/drawing/2014/main" id="{70DBFA4F-7733-4533-B1FE-5EF5E182BC94}"/>
+                    <a16:creationId xmlns:a16="http://schemas.microsoft.com/office/drawing/2014/main" id="{B0324639-9B0A-4E29-A32E-765C53D0EC76}"/>
                   </a:ext>
                 </a:extLst>
               </p:cNvPr>
@@ -5426,92 +5428,322 @@
             </p:style>
           </p:cxnSp>
         </p:grpSp>
-        <p:cxnSp>
-          <p:nvCxnSpPr>
-            <p:cNvPr id="26" name="연결선: 꺾임 25">
+        <p:grpSp>
+          <p:nvGrpSpPr>
+            <p:cNvPr id="30" name="그룹 29">
               <a:extLst>
                 <a:ext uri="{FF2B5EF4-FFF2-40B4-BE49-F238E27FC236}">
-                  <a16:creationId xmlns:a16="http://schemas.microsoft.com/office/drawing/2014/main" id="{01DC9DF2-721A-48AE-B3A2-3053E67440BE}"/>
+                  <a16:creationId xmlns:a16="http://schemas.microsoft.com/office/drawing/2014/main" id="{0C1FEAB6-C182-4EAE-AAAC-6A5A2B2594F6}"/>
                 </a:ext>
               </a:extLst>
             </p:cNvPr>
-            <p:cNvCxnSpPr>
-              <a:cxnSpLocks/>
-            </p:cNvCxnSpPr>
+            <p:cNvGrpSpPr/>
             <p:nvPr/>
-          </p:nvCxnSpPr>
-          <p:spPr>
-            <a:xfrm rot="5400000" flipH="1" flipV="1">
-              <a:off x="6822688" y="448484"/>
-              <a:ext cx="199749" cy="2602525"/>
+          </p:nvGrpSpPr>
+          <p:grpSpPr>
+            <a:xfrm>
+              <a:off x="6417108" y="3056116"/>
+              <a:ext cx="2939066" cy="389525"/>
+              <a:chOff x="6417108" y="3056116"/>
+              <a:chExt cx="2939066" cy="389525"/>
             </a:xfrm>
-            <a:prstGeom prst="bentConnector2">
-              <a:avLst/>
-            </a:prstGeom>
-            <a:ln w="19050">
-              <a:solidFill>
+          </p:grpSpPr>
+          <p:cxnSp>
+            <p:nvCxnSpPr>
+              <p:cNvPr id="19" name="연결선: 꺾임 18">
+                <a:extLst>
+                  <a:ext uri="{FF2B5EF4-FFF2-40B4-BE49-F238E27FC236}">
+                    <a16:creationId xmlns:a16="http://schemas.microsoft.com/office/drawing/2014/main" id="{F0F01E25-EB0F-4D5C-B6BC-49D8B2D4A905}"/>
+                  </a:ext>
+                </a:extLst>
+              </p:cNvPr>
+              <p:cNvCxnSpPr>
+                <a:cxnSpLocks/>
+              </p:cNvCxnSpPr>
+              <p:nvPr/>
+            </p:nvCxnSpPr>
+            <p:spPr>
+              <a:xfrm flipV="1">
+                <a:off x="6417108" y="3188214"/>
+                <a:ext cx="2118006" cy="257427"/>
+              </a:xfrm>
+              <a:prstGeom prst="bentConnector3">
+                <a:avLst>
+                  <a:gd name="adj1" fmla="val 55"/>
+                </a:avLst>
+              </a:prstGeom>
+              <a:ln w="57150">
+                <a:solidFill>
+                  <a:schemeClr val="tx1"/>
+                </a:solidFill>
+                <a:headEnd type="triangle"/>
+                <a:tailEnd type="none"/>
+              </a:ln>
+            </p:spPr>
+            <p:style>
+              <a:lnRef idx="1">
+                <a:schemeClr val="accent1"/>
+              </a:lnRef>
+              <a:fillRef idx="0">
+                <a:schemeClr val="accent1"/>
+              </a:fillRef>
+              <a:effectRef idx="0">
+                <a:schemeClr val="accent1"/>
+              </a:effectRef>
+              <a:fontRef idx="minor">
                 <a:schemeClr val="tx1"/>
-              </a:solidFill>
-              <a:headEnd type="triangle"/>
-              <a:tailEnd type="none"/>
-            </a:ln>
-          </p:spPr>
-          <p:style>
-            <a:lnRef idx="1">
-              <a:schemeClr val="accent1"/>
-            </a:lnRef>
-            <a:fillRef idx="0">
-              <a:schemeClr val="accent1"/>
-            </a:fillRef>
-            <a:effectRef idx="0">
-              <a:schemeClr val="accent1"/>
-            </a:effectRef>
-            <a:fontRef idx="minor">
-              <a:schemeClr val="tx1"/>
-            </a:fontRef>
-          </p:style>
-        </p:cxnSp>
-        <p:sp>
-          <p:nvSpPr>
-            <p:cNvPr id="35" name="TextBox 34">
+              </a:fontRef>
+            </p:style>
+          </p:cxnSp>
+          <p:sp>
+            <p:nvSpPr>
+              <p:cNvPr id="20" name="TextBox 19">
+                <a:extLst>
+                  <a:ext uri="{FF2B5EF4-FFF2-40B4-BE49-F238E27FC236}">
+                    <a16:creationId xmlns:a16="http://schemas.microsoft.com/office/drawing/2014/main" id="{4BC14E4A-66B8-4DC2-A7FC-3A72416C16E8}"/>
+                  </a:ext>
+                </a:extLst>
+              </p:cNvPr>
+              <p:cNvSpPr txBox="1"/>
+              <p:nvPr/>
+            </p:nvSpPr>
+            <p:spPr>
+              <a:xfrm>
+                <a:off x="8535115" y="3056116"/>
+                <a:ext cx="821059" cy="276999"/>
+              </a:xfrm>
+              <a:prstGeom prst="rect">
+                <a:avLst/>
+              </a:prstGeom>
+              <a:noFill/>
+            </p:spPr>
+            <p:txBody>
+              <a:bodyPr wrap="none" rtlCol="0">
+                <a:spAutoFit/>
+              </a:bodyPr>
+              <a:lstStyle/>
+              <a:p>
+                <a:r>
+                  <a:rPr lang="en-US" altLang="ko-KR" sz="1200" dirty="0"/>
+                  <a:t>nclr3[7:0]</a:t>
+                </a:r>
+                <a:endParaRPr lang="ko-KR" altLang="en-US" sz="1200" dirty="0"/>
+              </a:p>
+            </p:txBody>
+          </p:sp>
+        </p:grpSp>
+        <p:grpSp>
+          <p:nvGrpSpPr>
+            <p:cNvPr id="31" name="그룹 30">
               <a:extLst>
                 <a:ext uri="{FF2B5EF4-FFF2-40B4-BE49-F238E27FC236}">
-                  <a16:creationId xmlns:a16="http://schemas.microsoft.com/office/drawing/2014/main" id="{4E8CA0B5-DE8A-4AF6-8327-715A0DBAC101}"/>
+                  <a16:creationId xmlns:a16="http://schemas.microsoft.com/office/drawing/2014/main" id="{C534477F-1FA4-4AE1-B9E0-BC19D3D726C9}"/>
                 </a:ext>
               </a:extLst>
             </p:cNvPr>
-            <p:cNvSpPr txBox="1"/>
+            <p:cNvGrpSpPr/>
             <p:nvPr/>
-          </p:nvSpPr>
-          <p:spPr>
+          </p:nvGrpSpPr>
+          <p:grpSpPr>
             <a:xfrm>
-              <a:off x="8223826" y="1517775"/>
-              <a:ext cx="439544" cy="276999"/>
+              <a:off x="5932589" y="2724269"/>
+              <a:ext cx="3423584" cy="712162"/>
+              <a:chOff x="5932590" y="3056116"/>
+              <a:chExt cx="3423584" cy="712162"/>
             </a:xfrm>
-            <a:prstGeom prst="rect">
-              <a:avLst/>
-            </a:prstGeom>
-            <a:noFill/>
-          </p:spPr>
-          <p:txBody>
-            <a:bodyPr wrap="none" rtlCol="0">
-              <a:spAutoFit/>
-            </a:bodyPr>
-            <a:lstStyle/>
-            <a:p>
-              <a:r>
-                <a:rPr lang="en-US" altLang="ko-KR" sz="1200" dirty="0" err="1"/>
-                <a:t>nclr</a:t>
-              </a:r>
-              <a:endParaRPr lang="ko-KR" altLang="en-US" sz="1200" dirty="0"/>
-            </a:p>
-          </p:txBody>
-        </p:sp>
+          </p:grpSpPr>
+          <p:cxnSp>
+            <p:nvCxnSpPr>
+              <p:cNvPr id="32" name="연결선: 꺾임 31">
+                <a:extLst>
+                  <a:ext uri="{FF2B5EF4-FFF2-40B4-BE49-F238E27FC236}">
+                    <a16:creationId xmlns:a16="http://schemas.microsoft.com/office/drawing/2014/main" id="{0CEA071D-87FA-4183-8E7A-C2ABE9128F10}"/>
+                  </a:ext>
+                </a:extLst>
+              </p:cNvPr>
+              <p:cNvCxnSpPr>
+                <a:cxnSpLocks/>
+                <a:stCxn id="5" idx="0"/>
+              </p:cNvCxnSpPr>
+              <p:nvPr/>
+            </p:nvCxnSpPr>
+            <p:spPr>
+              <a:xfrm rot="5400000" flipH="1" flipV="1">
+                <a:off x="6943821" y="2176986"/>
+                <a:ext cx="580061" cy="2602523"/>
+              </a:xfrm>
+              <a:prstGeom prst="bentConnector2">
+                <a:avLst/>
+              </a:prstGeom>
+              <a:ln w="57150">
+                <a:solidFill>
+                  <a:schemeClr val="tx1"/>
+                </a:solidFill>
+                <a:headEnd type="triangle"/>
+                <a:tailEnd type="none"/>
+              </a:ln>
+            </p:spPr>
+            <p:style>
+              <a:lnRef idx="1">
+                <a:schemeClr val="accent1"/>
+              </a:lnRef>
+              <a:fillRef idx="0">
+                <a:schemeClr val="accent1"/>
+              </a:fillRef>
+              <a:effectRef idx="0">
+                <a:schemeClr val="accent1"/>
+              </a:effectRef>
+              <a:fontRef idx="minor">
+                <a:schemeClr val="tx1"/>
+              </a:fontRef>
+            </p:style>
+          </p:cxnSp>
+          <p:sp>
+            <p:nvSpPr>
+              <p:cNvPr id="33" name="TextBox 32">
+                <a:extLst>
+                  <a:ext uri="{FF2B5EF4-FFF2-40B4-BE49-F238E27FC236}">
+                    <a16:creationId xmlns:a16="http://schemas.microsoft.com/office/drawing/2014/main" id="{DA501DE9-6FFF-4B63-B90F-3A8A5A8A11F5}"/>
+                  </a:ext>
+                </a:extLst>
+              </p:cNvPr>
+              <p:cNvSpPr txBox="1"/>
+              <p:nvPr/>
+            </p:nvSpPr>
+            <p:spPr>
+              <a:xfrm>
+                <a:off x="8535115" y="3056116"/>
+                <a:ext cx="821059" cy="276999"/>
+              </a:xfrm>
+              <a:prstGeom prst="rect">
+                <a:avLst/>
+              </a:prstGeom>
+              <a:noFill/>
+            </p:spPr>
+            <p:txBody>
+              <a:bodyPr wrap="none" rtlCol="0">
+                <a:spAutoFit/>
+              </a:bodyPr>
+              <a:lstStyle/>
+              <a:p>
+                <a:r>
+                  <a:rPr lang="en-US" altLang="ko-KR" sz="1200" dirty="0"/>
+                  <a:t>nclr2[7:0]</a:t>
+                </a:r>
+                <a:endParaRPr lang="ko-KR" altLang="en-US" sz="1200" dirty="0"/>
+              </a:p>
+            </p:txBody>
+          </p:sp>
+        </p:grpSp>
+        <p:grpSp>
+          <p:nvGrpSpPr>
+            <p:cNvPr id="34" name="그룹 33">
+              <a:extLst>
+                <a:ext uri="{FF2B5EF4-FFF2-40B4-BE49-F238E27FC236}">
+                  <a16:creationId xmlns:a16="http://schemas.microsoft.com/office/drawing/2014/main" id="{73228217-1198-4288-982F-FBEC09E124C6}"/>
+                </a:ext>
+              </a:extLst>
+            </p:cNvPr>
+            <p:cNvGrpSpPr/>
+            <p:nvPr/>
+          </p:nvGrpSpPr>
+          <p:grpSpPr>
+            <a:xfrm>
+              <a:off x="5406302" y="2368189"/>
+              <a:ext cx="3949871" cy="1060811"/>
+              <a:chOff x="5406303" y="3056116"/>
+              <a:chExt cx="3949871" cy="1060811"/>
+            </a:xfrm>
+          </p:grpSpPr>
+          <p:cxnSp>
+            <p:nvCxnSpPr>
+              <p:cNvPr id="35" name="연결선: 꺾임 34">
+                <a:extLst>
+                  <a:ext uri="{FF2B5EF4-FFF2-40B4-BE49-F238E27FC236}">
+                    <a16:creationId xmlns:a16="http://schemas.microsoft.com/office/drawing/2014/main" id="{8B99AB5A-84A2-495A-8F6B-A612CB624BF3}"/>
+                  </a:ext>
+                </a:extLst>
+              </p:cNvPr>
+              <p:cNvCxnSpPr>
+                <a:cxnSpLocks/>
+              </p:cNvCxnSpPr>
+              <p:nvPr/>
+            </p:nvCxnSpPr>
+            <p:spPr>
+              <a:xfrm flipV="1">
+                <a:off x="5406303" y="3188214"/>
+                <a:ext cx="3128811" cy="928713"/>
+              </a:xfrm>
+              <a:prstGeom prst="bentConnector3">
+                <a:avLst>
+                  <a:gd name="adj1" fmla="val 145"/>
+                </a:avLst>
+              </a:prstGeom>
+              <a:ln w="57150">
+                <a:solidFill>
+                  <a:schemeClr val="tx1"/>
+                </a:solidFill>
+                <a:headEnd type="triangle"/>
+                <a:tailEnd type="none"/>
+              </a:ln>
+            </p:spPr>
+            <p:style>
+              <a:lnRef idx="1">
+                <a:schemeClr val="accent1"/>
+              </a:lnRef>
+              <a:fillRef idx="0">
+                <a:schemeClr val="accent1"/>
+              </a:fillRef>
+              <a:effectRef idx="0">
+                <a:schemeClr val="accent1"/>
+              </a:effectRef>
+              <a:fontRef idx="minor">
+                <a:schemeClr val="tx1"/>
+              </a:fontRef>
+            </p:style>
+          </p:cxnSp>
+          <p:sp>
+            <p:nvSpPr>
+              <p:cNvPr id="36" name="TextBox 35">
+                <a:extLst>
+                  <a:ext uri="{FF2B5EF4-FFF2-40B4-BE49-F238E27FC236}">
+                    <a16:creationId xmlns:a16="http://schemas.microsoft.com/office/drawing/2014/main" id="{4448F761-C2CB-4D84-867E-AC0E3EB620E0}"/>
+                  </a:ext>
+                </a:extLst>
+              </p:cNvPr>
+              <p:cNvSpPr txBox="1"/>
+              <p:nvPr/>
+            </p:nvSpPr>
+            <p:spPr>
+              <a:xfrm>
+                <a:off x="8535115" y="3056116"/>
+                <a:ext cx="821059" cy="276999"/>
+              </a:xfrm>
+              <a:prstGeom prst="rect">
+                <a:avLst/>
+              </a:prstGeom>
+              <a:noFill/>
+            </p:spPr>
+            <p:txBody>
+              <a:bodyPr wrap="none" rtlCol="0">
+                <a:spAutoFit/>
+              </a:bodyPr>
+              <a:lstStyle/>
+              <a:p>
+                <a:r>
+                  <a:rPr lang="en-US" altLang="ko-KR" sz="1200" dirty="0"/>
+                  <a:t>nclr1[7:0]</a:t>
+                </a:r>
+                <a:endParaRPr lang="ko-KR" altLang="en-US" sz="1200" dirty="0"/>
+              </a:p>
+            </p:txBody>
+          </p:sp>
+        </p:grpSp>
       </p:grpSp>
     </p:spTree>
     <p:extLst>
       <p:ext uri="{BB962C8B-B14F-4D97-AF65-F5344CB8AC3E}">
-        <p14:creationId xmlns:p14="http://schemas.microsoft.com/office/powerpoint/2010/main" val="180542123"/>
+        <p14:creationId xmlns:p14="http://schemas.microsoft.com/office/powerpoint/2010/main" val="1824232684"/>
       </p:ext>
     </p:extLst>
   </p:cSld>
@@ -8216,6 +8448,2131 @@
 </p:sld>
 </file>
 
+<file path=ppt/slides/slide5.xml><?xml version="1.0" encoding="utf-8"?>
+<p:sld xmlns:a="http://schemas.openxmlformats.org/drawingml/2006/main" xmlns:r="http://schemas.openxmlformats.org/officeDocument/2006/relationships" xmlns:p="http://schemas.openxmlformats.org/presentationml/2006/main">
+  <p:cSld>
+    <p:spTree>
+      <p:nvGrpSpPr>
+        <p:cNvPr id="1" name=""/>
+        <p:cNvGrpSpPr/>
+        <p:nvPr/>
+      </p:nvGrpSpPr>
+      <p:grpSpPr>
+        <a:xfrm>
+          <a:off x="0" y="0"/>
+          <a:ext cx="0" cy="0"/>
+          <a:chOff x="0" y="0"/>
+          <a:chExt cx="0" cy="0"/>
+        </a:xfrm>
+      </p:grpSpPr>
+      <p:grpSp>
+        <p:nvGrpSpPr>
+          <p:cNvPr id="44" name="그룹 43">
+            <a:extLst>
+              <a:ext uri="{FF2B5EF4-FFF2-40B4-BE49-F238E27FC236}">
+                <a16:creationId xmlns:a16="http://schemas.microsoft.com/office/drawing/2014/main" id="{DD805D5A-004A-44AF-AB9A-75C5C21712DC}"/>
+              </a:ext>
+            </a:extLst>
+          </p:cNvPr>
+          <p:cNvGrpSpPr/>
+          <p:nvPr/>
+        </p:nvGrpSpPr>
+        <p:grpSpPr>
+          <a:xfrm>
+            <a:off x="2731550" y="1891553"/>
+            <a:ext cx="6966618" cy="3009332"/>
+            <a:chOff x="2724339" y="1559931"/>
+            <a:chExt cx="7734324" cy="3340954"/>
+          </a:xfrm>
+        </p:grpSpPr>
+        <p:sp>
+          <p:nvSpPr>
+            <p:cNvPr id="11" name="직사각형 10">
+              <a:extLst>
+                <a:ext uri="{FF2B5EF4-FFF2-40B4-BE49-F238E27FC236}">
+                  <a16:creationId xmlns:a16="http://schemas.microsoft.com/office/drawing/2014/main" id="{76C6D612-7619-4E7A-A497-C90DD7981146}"/>
+                </a:ext>
+              </a:extLst>
+            </p:cNvPr>
+            <p:cNvSpPr/>
+            <p:nvPr/>
+          </p:nvSpPr>
+          <p:spPr>
+            <a:xfrm>
+              <a:off x="4455639" y="2599981"/>
+              <a:ext cx="2830394" cy="1632919"/>
+            </a:xfrm>
+            <a:prstGeom prst="rect">
+              <a:avLst/>
+            </a:prstGeom>
+            <a:noFill/>
+            <a:ln w="19050">
+              <a:solidFill>
+                <a:schemeClr val="tx1"/>
+              </a:solidFill>
+            </a:ln>
+          </p:spPr>
+          <p:style>
+            <a:lnRef idx="2">
+              <a:schemeClr val="accent1">
+                <a:shade val="50000"/>
+              </a:schemeClr>
+            </a:lnRef>
+            <a:fillRef idx="1">
+              <a:schemeClr val="accent1"/>
+            </a:fillRef>
+            <a:effectRef idx="0">
+              <a:schemeClr val="accent1"/>
+            </a:effectRef>
+            <a:fontRef idx="minor">
+              <a:schemeClr val="lt1"/>
+            </a:fontRef>
+          </p:style>
+          <p:txBody>
+            <a:bodyPr rtlCol="0" anchor="ctr"/>
+            <a:lstStyle/>
+            <a:p>
+              <a:pPr algn="ctr"/>
+              <a:endParaRPr lang="ko-KR" altLang="en-US"/>
+            </a:p>
+          </p:txBody>
+        </p:sp>
+        <p:sp>
+          <p:nvSpPr>
+            <p:cNvPr id="13" name="TextBox 12">
+              <a:extLst>
+                <a:ext uri="{FF2B5EF4-FFF2-40B4-BE49-F238E27FC236}">
+                  <a16:creationId xmlns:a16="http://schemas.microsoft.com/office/drawing/2014/main" id="{FC00A46D-62E8-4111-A712-2F2B91956D98}"/>
+                </a:ext>
+              </a:extLst>
+            </p:cNvPr>
+            <p:cNvSpPr txBox="1"/>
+            <p:nvPr/>
+          </p:nvSpPr>
+          <p:spPr>
+            <a:xfrm>
+              <a:off x="5102239" y="2930448"/>
+              <a:ext cx="1537189" cy="922571"/>
+            </a:xfrm>
+            <a:prstGeom prst="rect">
+              <a:avLst/>
+            </a:prstGeom>
+            <a:noFill/>
+          </p:spPr>
+          <p:txBody>
+            <a:bodyPr wrap="square" rtlCol="0">
+              <a:spAutoFit/>
+            </a:bodyPr>
+            <a:lstStyle/>
+            <a:p>
+              <a:pPr algn="ctr"/>
+              <a:r>
+                <a:rPr lang="en-US" altLang="ko-KR" sz="2400" dirty="0" err="1"/>
+                <a:t>ThreeBit</a:t>
+              </a:r>
+              <a:endParaRPr lang="en-US" altLang="ko-KR" sz="2400" dirty="0"/>
+            </a:p>
+            <a:p>
+              <a:pPr algn="ctr"/>
+              <a:r>
+                <a:rPr lang="en-US" altLang="ko-KR" sz="2400" dirty="0"/>
+                <a:t>Detector</a:t>
+              </a:r>
+              <a:endParaRPr lang="ko-KR" altLang="en-US" sz="2400" dirty="0"/>
+            </a:p>
+          </p:txBody>
+        </p:sp>
+        <p:cxnSp>
+          <p:nvCxnSpPr>
+            <p:cNvPr id="14" name="직선 화살표 연결선 13">
+              <a:extLst>
+                <a:ext uri="{FF2B5EF4-FFF2-40B4-BE49-F238E27FC236}">
+                  <a16:creationId xmlns:a16="http://schemas.microsoft.com/office/drawing/2014/main" id="{E42A4CF0-52AD-4BEF-A7FA-4E40B1766AC5}"/>
+                </a:ext>
+              </a:extLst>
+            </p:cNvPr>
+            <p:cNvCxnSpPr>
+              <a:cxnSpLocks/>
+            </p:cNvCxnSpPr>
+            <p:nvPr/>
+          </p:nvCxnSpPr>
+          <p:spPr>
+            <a:xfrm flipH="1">
+              <a:off x="7286032" y="3423165"/>
+              <a:ext cx="2385575" cy="0"/>
+            </a:xfrm>
+            <a:prstGeom prst="straightConnector1">
+              <a:avLst/>
+            </a:prstGeom>
+            <a:ln w="19050">
+              <a:solidFill>
+                <a:schemeClr val="tx1"/>
+              </a:solidFill>
+              <a:tailEnd type="triangle"/>
+            </a:ln>
+          </p:spPr>
+          <p:style>
+            <a:lnRef idx="1">
+              <a:schemeClr val="accent1"/>
+            </a:lnRef>
+            <a:fillRef idx="0">
+              <a:schemeClr val="accent1"/>
+            </a:fillRef>
+            <a:effectRef idx="0">
+              <a:schemeClr val="accent1"/>
+            </a:effectRef>
+            <a:fontRef idx="minor">
+              <a:schemeClr val="tx1"/>
+            </a:fontRef>
+          </p:style>
+        </p:cxnSp>
+        <p:sp>
+          <p:nvSpPr>
+            <p:cNvPr id="17" name="TextBox 16">
+              <a:extLst>
+                <a:ext uri="{FF2B5EF4-FFF2-40B4-BE49-F238E27FC236}">
+                  <a16:creationId xmlns:a16="http://schemas.microsoft.com/office/drawing/2014/main" id="{FE4DA396-E7E3-4272-AC61-4F90FC97C631}"/>
+                </a:ext>
+              </a:extLst>
+            </p:cNvPr>
+            <p:cNvSpPr txBox="1"/>
+            <p:nvPr/>
+          </p:nvSpPr>
+          <p:spPr>
+            <a:xfrm>
+              <a:off x="9671605" y="3207448"/>
+              <a:ext cx="411716" cy="276999"/>
+            </a:xfrm>
+            <a:prstGeom prst="rect">
+              <a:avLst/>
+            </a:prstGeom>
+            <a:noFill/>
+          </p:spPr>
+          <p:txBody>
+            <a:bodyPr wrap="none" rtlCol="0">
+              <a:spAutoFit/>
+            </a:bodyPr>
+            <a:lstStyle/>
+            <a:p>
+              <a:r>
+                <a:rPr lang="en-US" altLang="ko-KR" sz="1200" dirty="0"/>
+                <a:t>reg</a:t>
+              </a:r>
+              <a:endParaRPr lang="ko-KR" altLang="en-US" sz="1200" dirty="0"/>
+            </a:p>
+          </p:txBody>
+        </p:sp>
+        <p:sp>
+          <p:nvSpPr>
+            <p:cNvPr id="19" name="이등변 삼각형 18">
+              <a:extLst>
+                <a:ext uri="{FF2B5EF4-FFF2-40B4-BE49-F238E27FC236}">
+                  <a16:creationId xmlns:a16="http://schemas.microsoft.com/office/drawing/2014/main" id="{1AE5A199-1AA8-4838-BB71-A405F6DC343D}"/>
+                </a:ext>
+              </a:extLst>
+            </p:cNvPr>
+            <p:cNvSpPr/>
+            <p:nvPr/>
+          </p:nvSpPr>
+          <p:spPr>
+            <a:xfrm>
+              <a:off x="5636584" y="3829016"/>
+              <a:ext cx="468504" cy="403884"/>
+            </a:xfrm>
+            <a:prstGeom prst="triangle">
+              <a:avLst/>
+            </a:prstGeom>
+            <a:noFill/>
+            <a:ln w="19050">
+              <a:solidFill>
+                <a:schemeClr val="tx1"/>
+              </a:solidFill>
+            </a:ln>
+          </p:spPr>
+          <p:style>
+            <a:lnRef idx="2">
+              <a:schemeClr val="accent1">
+                <a:shade val="50000"/>
+              </a:schemeClr>
+            </a:lnRef>
+            <a:fillRef idx="1">
+              <a:schemeClr val="accent1"/>
+            </a:fillRef>
+            <a:effectRef idx="0">
+              <a:schemeClr val="accent1"/>
+            </a:effectRef>
+            <a:fontRef idx="minor">
+              <a:schemeClr val="lt1"/>
+            </a:fontRef>
+          </p:style>
+          <p:txBody>
+            <a:bodyPr rtlCol="0" anchor="ctr"/>
+            <a:lstStyle/>
+            <a:p>
+              <a:pPr algn="ctr"/>
+              <a:endParaRPr lang="ko-KR" altLang="en-US"/>
+            </a:p>
+          </p:txBody>
+        </p:sp>
+        <p:cxnSp>
+          <p:nvCxnSpPr>
+            <p:cNvPr id="20" name="연결선: 꺾임 19">
+              <a:extLst>
+                <a:ext uri="{FF2B5EF4-FFF2-40B4-BE49-F238E27FC236}">
+                  <a16:creationId xmlns:a16="http://schemas.microsoft.com/office/drawing/2014/main" id="{3994BFB4-2449-4D92-959E-D9939E2A3ACB}"/>
+                </a:ext>
+              </a:extLst>
+            </p:cNvPr>
+            <p:cNvCxnSpPr>
+              <a:cxnSpLocks/>
+              <a:stCxn id="19" idx="3"/>
+              <a:endCxn id="21" idx="1"/>
+            </p:cNvCxnSpPr>
+            <p:nvPr/>
+          </p:nvCxnSpPr>
+          <p:spPr>
+            <a:xfrm rot="16200000" flipH="1">
+              <a:off x="7636422" y="2467312"/>
+              <a:ext cx="269593" cy="3800767"/>
+            </a:xfrm>
+            <a:prstGeom prst="bentConnector2">
+              <a:avLst/>
+            </a:prstGeom>
+            <a:ln w="19050">
+              <a:solidFill>
+                <a:schemeClr val="tx1"/>
+              </a:solidFill>
+              <a:headEnd type="triangle"/>
+              <a:tailEnd type="none"/>
+            </a:ln>
+          </p:spPr>
+          <p:style>
+            <a:lnRef idx="1">
+              <a:schemeClr val="accent1"/>
+            </a:lnRef>
+            <a:fillRef idx="0">
+              <a:schemeClr val="accent1"/>
+            </a:fillRef>
+            <a:effectRef idx="0">
+              <a:schemeClr val="accent1"/>
+            </a:effectRef>
+            <a:fontRef idx="minor">
+              <a:schemeClr val="tx1"/>
+            </a:fontRef>
+          </p:style>
+        </p:cxnSp>
+        <p:sp>
+          <p:nvSpPr>
+            <p:cNvPr id="21" name="TextBox 20">
+              <a:extLst>
+                <a:ext uri="{FF2B5EF4-FFF2-40B4-BE49-F238E27FC236}">
+                  <a16:creationId xmlns:a16="http://schemas.microsoft.com/office/drawing/2014/main" id="{FCAD8D66-89EE-4CF7-BAAD-55242DC8B921}"/>
+                </a:ext>
+              </a:extLst>
+            </p:cNvPr>
+            <p:cNvSpPr txBox="1"/>
+            <p:nvPr/>
+          </p:nvSpPr>
+          <p:spPr>
+            <a:xfrm>
+              <a:off x="9671602" y="4300224"/>
+              <a:ext cx="787061" cy="404534"/>
+            </a:xfrm>
+            <a:prstGeom prst="rect">
+              <a:avLst/>
+            </a:prstGeom>
+            <a:noFill/>
+          </p:spPr>
+          <p:txBody>
+            <a:bodyPr wrap="none" rtlCol="0">
+              <a:spAutoFit/>
+            </a:bodyPr>
+            <a:lstStyle/>
+            <a:p>
+              <a:r>
+                <a:rPr lang="en-US" altLang="ko-KR" sz="1200" dirty="0"/>
+                <a:t>clock</a:t>
+              </a:r>
+              <a:endParaRPr lang="ko-KR" altLang="en-US" sz="1200" dirty="0"/>
+            </a:p>
+          </p:txBody>
+        </p:sp>
+        <p:grpSp>
+          <p:nvGrpSpPr>
+            <p:cNvPr id="24" name="그룹 23">
+              <a:extLst>
+                <a:ext uri="{FF2B5EF4-FFF2-40B4-BE49-F238E27FC236}">
+                  <a16:creationId xmlns:a16="http://schemas.microsoft.com/office/drawing/2014/main" id="{130720E8-CE2C-47C0-B56E-4FB89FB2A612}"/>
+                </a:ext>
+              </a:extLst>
+            </p:cNvPr>
+            <p:cNvGrpSpPr/>
+            <p:nvPr/>
+          </p:nvGrpSpPr>
+          <p:grpSpPr>
+            <a:xfrm>
+              <a:off x="2724339" y="3207450"/>
+              <a:ext cx="1731299" cy="312921"/>
+              <a:chOff x="719144" y="1861244"/>
+              <a:chExt cx="2607239" cy="191257"/>
+            </a:xfrm>
+          </p:grpSpPr>
+          <p:cxnSp>
+            <p:nvCxnSpPr>
+              <p:cNvPr id="34" name="직선 화살표 연결선 33">
+                <a:extLst>
+                  <a:ext uri="{FF2B5EF4-FFF2-40B4-BE49-F238E27FC236}">
+                    <a16:creationId xmlns:a16="http://schemas.microsoft.com/office/drawing/2014/main" id="{915100A8-CEDE-4C07-BB47-2110FE500641}"/>
+                  </a:ext>
+                </a:extLst>
+              </p:cNvPr>
+              <p:cNvCxnSpPr/>
+              <p:nvPr/>
+            </p:nvCxnSpPr>
+            <p:spPr>
+              <a:xfrm flipH="1">
+                <a:off x="1692892" y="2001328"/>
+                <a:ext cx="1633491" cy="0"/>
+              </a:xfrm>
+              <a:prstGeom prst="straightConnector1">
+                <a:avLst/>
+              </a:prstGeom>
+              <a:ln w="19050">
+                <a:solidFill>
+                  <a:schemeClr val="tx1"/>
+                </a:solidFill>
+                <a:tailEnd type="triangle"/>
+              </a:ln>
+            </p:spPr>
+            <p:style>
+              <a:lnRef idx="1">
+                <a:schemeClr val="accent1"/>
+              </a:lnRef>
+              <a:fillRef idx="0">
+                <a:schemeClr val="accent1"/>
+              </a:fillRef>
+              <a:effectRef idx="0">
+                <a:schemeClr val="accent1"/>
+              </a:effectRef>
+              <a:fontRef idx="minor">
+                <a:schemeClr val="tx1"/>
+              </a:fontRef>
+            </p:style>
+          </p:cxnSp>
+          <p:sp>
+            <p:nvSpPr>
+              <p:cNvPr id="35" name="TextBox 34">
+                <a:extLst>
+                  <a:ext uri="{FF2B5EF4-FFF2-40B4-BE49-F238E27FC236}">
+                    <a16:creationId xmlns:a16="http://schemas.microsoft.com/office/drawing/2014/main" id="{3C90E82A-932B-4819-8B23-57C2DB0AE426}"/>
+                  </a:ext>
+                </a:extLst>
+              </p:cNvPr>
+              <p:cNvSpPr txBox="1"/>
+              <p:nvPr/>
+            </p:nvSpPr>
+            <p:spPr>
+              <a:xfrm>
+                <a:off x="719144" y="1861244"/>
+                <a:ext cx="973747" cy="191257"/>
+              </a:xfrm>
+              <a:prstGeom prst="rect">
+                <a:avLst/>
+              </a:prstGeom>
+              <a:noFill/>
+            </p:spPr>
+            <p:txBody>
+              <a:bodyPr wrap="square" rtlCol="0">
+                <a:spAutoFit/>
+              </a:bodyPr>
+              <a:lstStyle/>
+              <a:p>
+                <a:r>
+                  <a:rPr lang="en-US" altLang="ko-KR" sz="1200" dirty="0"/>
+                  <a:t>score</a:t>
+                </a:r>
+                <a:endParaRPr lang="ko-KR" altLang="en-US" sz="1200" dirty="0"/>
+              </a:p>
+            </p:txBody>
+          </p:sp>
+        </p:grpSp>
+        <p:grpSp>
+          <p:nvGrpSpPr>
+            <p:cNvPr id="26" name="그룹 25">
+              <a:extLst>
+                <a:ext uri="{FF2B5EF4-FFF2-40B4-BE49-F238E27FC236}">
+                  <a16:creationId xmlns:a16="http://schemas.microsoft.com/office/drawing/2014/main" id="{BC2500D5-0C5D-4463-959C-B23DE71D0C43}"/>
+                </a:ext>
+              </a:extLst>
+            </p:cNvPr>
+            <p:cNvGrpSpPr/>
+            <p:nvPr/>
+          </p:nvGrpSpPr>
+          <p:grpSpPr>
+            <a:xfrm>
+              <a:off x="5870836" y="1559931"/>
+              <a:ext cx="4306034" cy="1040052"/>
+              <a:chOff x="5932590" y="3056116"/>
+              <a:chExt cx="2948500" cy="712162"/>
+            </a:xfrm>
+          </p:grpSpPr>
+          <p:cxnSp>
+            <p:nvCxnSpPr>
+              <p:cNvPr id="30" name="연결선: 꺾임 29">
+                <a:extLst>
+                  <a:ext uri="{FF2B5EF4-FFF2-40B4-BE49-F238E27FC236}">
+                    <a16:creationId xmlns:a16="http://schemas.microsoft.com/office/drawing/2014/main" id="{813AB712-0C86-4421-9B66-5D55016DA087}"/>
+                  </a:ext>
+                </a:extLst>
+              </p:cNvPr>
+              <p:cNvCxnSpPr>
+                <a:cxnSpLocks/>
+                <a:stCxn id="11" idx="0"/>
+              </p:cNvCxnSpPr>
+              <p:nvPr/>
+            </p:nvCxnSpPr>
+            <p:spPr>
+              <a:xfrm rot="5400000" flipH="1" flipV="1">
+                <a:off x="6943821" y="2176986"/>
+                <a:ext cx="580061" cy="2602523"/>
+              </a:xfrm>
+              <a:prstGeom prst="bentConnector2">
+                <a:avLst/>
+              </a:prstGeom>
+              <a:ln w="19050">
+                <a:solidFill>
+                  <a:schemeClr val="tx1"/>
+                </a:solidFill>
+                <a:headEnd type="triangle"/>
+                <a:tailEnd type="none"/>
+              </a:ln>
+            </p:spPr>
+            <p:style>
+              <a:lnRef idx="1">
+                <a:schemeClr val="accent1"/>
+              </a:lnRef>
+              <a:fillRef idx="0">
+                <a:schemeClr val="accent1"/>
+              </a:fillRef>
+              <a:effectRef idx="0">
+                <a:schemeClr val="accent1"/>
+              </a:effectRef>
+              <a:fontRef idx="minor">
+                <a:schemeClr val="tx1"/>
+              </a:fontRef>
+            </p:style>
+          </p:cxnSp>
+          <p:sp>
+            <p:nvSpPr>
+              <p:cNvPr id="31" name="TextBox 30">
+                <a:extLst>
+                  <a:ext uri="{FF2B5EF4-FFF2-40B4-BE49-F238E27FC236}">
+                    <a16:creationId xmlns:a16="http://schemas.microsoft.com/office/drawing/2014/main" id="{92AC5B80-333C-49B8-9425-DA55BF67DE3C}"/>
+                  </a:ext>
+                </a:extLst>
+              </p:cNvPr>
+              <p:cNvSpPr txBox="1"/>
+              <p:nvPr/>
+            </p:nvSpPr>
+            <p:spPr>
+              <a:xfrm>
+                <a:off x="8535115" y="3056116"/>
+                <a:ext cx="345975" cy="189671"/>
+              </a:xfrm>
+              <a:prstGeom prst="rect">
+                <a:avLst/>
+              </a:prstGeom>
+              <a:noFill/>
+            </p:spPr>
+            <p:txBody>
+              <a:bodyPr wrap="none" rtlCol="0">
+                <a:spAutoFit/>
+              </a:bodyPr>
+              <a:lstStyle/>
+              <a:p>
+                <a:r>
+                  <a:rPr lang="en-US" altLang="ko-KR" sz="1200" dirty="0"/>
+                  <a:t>btn2</a:t>
+                </a:r>
+                <a:endParaRPr lang="ko-KR" altLang="en-US" sz="1200" dirty="0"/>
+              </a:p>
+            </p:txBody>
+          </p:sp>
+        </p:grpSp>
+        <p:cxnSp>
+          <p:nvCxnSpPr>
+            <p:cNvPr id="9" name="연결선: 꺾임 8">
+              <a:extLst>
+                <a:ext uri="{FF2B5EF4-FFF2-40B4-BE49-F238E27FC236}">
+                  <a16:creationId xmlns:a16="http://schemas.microsoft.com/office/drawing/2014/main" id="{61AF2037-22AB-4CBF-85BD-2EE8879B741F}"/>
+                </a:ext>
+              </a:extLst>
+            </p:cNvPr>
+            <p:cNvCxnSpPr>
+              <a:cxnSpLocks/>
+              <a:endCxn id="10" idx="1"/>
+            </p:cNvCxnSpPr>
+            <p:nvPr/>
+          </p:nvCxnSpPr>
+          <p:spPr>
+            <a:xfrm>
+              <a:off x="4678050" y="4232230"/>
+              <a:ext cx="4993552" cy="530156"/>
+            </a:xfrm>
+            <a:prstGeom prst="bentConnector3">
+              <a:avLst>
+                <a:gd name="adj1" fmla="val 92"/>
+              </a:avLst>
+            </a:prstGeom>
+            <a:ln w="19050">
+              <a:solidFill>
+                <a:schemeClr val="tx1"/>
+              </a:solidFill>
+              <a:headEnd type="triangle"/>
+              <a:tailEnd type="none"/>
+            </a:ln>
+          </p:spPr>
+          <p:style>
+            <a:lnRef idx="1">
+              <a:schemeClr val="accent1"/>
+            </a:lnRef>
+            <a:fillRef idx="0">
+              <a:schemeClr val="accent1"/>
+            </a:fillRef>
+            <a:effectRef idx="0">
+              <a:schemeClr val="accent1"/>
+            </a:effectRef>
+            <a:fontRef idx="minor">
+              <a:schemeClr val="tx1"/>
+            </a:fontRef>
+          </p:style>
+        </p:cxnSp>
+        <p:sp>
+          <p:nvSpPr>
+            <p:cNvPr id="10" name="TextBox 9">
+              <a:extLst>
+                <a:ext uri="{FF2B5EF4-FFF2-40B4-BE49-F238E27FC236}">
+                  <a16:creationId xmlns:a16="http://schemas.microsoft.com/office/drawing/2014/main" id="{000B3488-08F2-4C70-8DAA-D35892D765DD}"/>
+                </a:ext>
+              </a:extLst>
+            </p:cNvPr>
+            <p:cNvSpPr txBox="1"/>
+            <p:nvPr/>
+          </p:nvSpPr>
+          <p:spPr>
+            <a:xfrm>
+              <a:off x="9671602" y="4623886"/>
+              <a:ext cx="439544" cy="276999"/>
+            </a:xfrm>
+            <a:prstGeom prst="rect">
+              <a:avLst/>
+            </a:prstGeom>
+            <a:noFill/>
+          </p:spPr>
+          <p:txBody>
+            <a:bodyPr wrap="none" rtlCol="0">
+              <a:spAutoFit/>
+            </a:bodyPr>
+            <a:lstStyle/>
+            <a:p>
+              <a:r>
+                <a:rPr lang="en-US" altLang="ko-KR" sz="1200" dirty="0" err="1"/>
+                <a:t>nclr</a:t>
+              </a:r>
+              <a:endParaRPr lang="ko-KR" altLang="en-US" sz="1200" dirty="0"/>
+            </a:p>
+          </p:txBody>
+        </p:sp>
+      </p:grpSp>
+    </p:spTree>
+    <p:extLst>
+      <p:ext uri="{BB962C8B-B14F-4D97-AF65-F5344CB8AC3E}">
+        <p14:creationId xmlns:p14="http://schemas.microsoft.com/office/powerpoint/2010/main" val="2353786635"/>
+      </p:ext>
+    </p:extLst>
+  </p:cSld>
+  <p:clrMapOvr>
+    <a:masterClrMapping/>
+  </p:clrMapOvr>
+</p:sld>
+</file>
+
+<file path=ppt/slides/slide6.xml><?xml version="1.0" encoding="utf-8"?>
+<p:sld xmlns:a="http://schemas.openxmlformats.org/drawingml/2006/main" xmlns:r="http://schemas.openxmlformats.org/officeDocument/2006/relationships" xmlns:p="http://schemas.openxmlformats.org/presentationml/2006/main">
+  <p:cSld>
+    <p:spTree>
+      <p:nvGrpSpPr>
+        <p:cNvPr id="1" name=""/>
+        <p:cNvGrpSpPr/>
+        <p:nvPr/>
+      </p:nvGrpSpPr>
+      <p:grpSpPr>
+        <a:xfrm>
+          <a:off x="0" y="0"/>
+          <a:ext cx="0" cy="0"/>
+          <a:chOff x="0" y="0"/>
+          <a:chExt cx="0" cy="0"/>
+        </a:xfrm>
+      </p:grpSpPr>
+      <p:grpSp>
+        <p:nvGrpSpPr>
+          <p:cNvPr id="45" name="그룹 44">
+            <a:extLst>
+              <a:ext uri="{FF2B5EF4-FFF2-40B4-BE49-F238E27FC236}">
+                <a16:creationId xmlns:a16="http://schemas.microsoft.com/office/drawing/2014/main" id="{27F358CB-47BE-4BF0-94A5-D5BC201A5554}"/>
+              </a:ext>
+            </a:extLst>
+          </p:cNvPr>
+          <p:cNvGrpSpPr/>
+          <p:nvPr/>
+        </p:nvGrpSpPr>
+        <p:grpSpPr>
+          <a:xfrm>
+            <a:off x="807765" y="1039906"/>
+            <a:ext cx="10053563" cy="4331778"/>
+            <a:chOff x="807765" y="1039906"/>
+            <a:chExt cx="10053563" cy="4331778"/>
+          </a:xfrm>
+        </p:grpSpPr>
+        <p:grpSp>
+          <p:nvGrpSpPr>
+            <p:cNvPr id="50" name="그룹 49">
+              <a:extLst>
+                <a:ext uri="{FF2B5EF4-FFF2-40B4-BE49-F238E27FC236}">
+                  <a16:creationId xmlns:a16="http://schemas.microsoft.com/office/drawing/2014/main" id="{9686FEF8-315C-4DC1-A06B-B0E18C3E5006}"/>
+                </a:ext>
+              </a:extLst>
+            </p:cNvPr>
+            <p:cNvGrpSpPr/>
+            <p:nvPr/>
+          </p:nvGrpSpPr>
+          <p:grpSpPr>
+            <a:xfrm>
+              <a:off x="807765" y="1039906"/>
+              <a:ext cx="10053563" cy="4331778"/>
+              <a:chOff x="2465718" y="2368189"/>
+              <a:chExt cx="6884045" cy="2966128"/>
+            </a:xfrm>
+          </p:grpSpPr>
+          <p:sp>
+            <p:nvSpPr>
+              <p:cNvPr id="5" name="직사각형 4">
+                <a:extLst>
+                  <a:ext uri="{FF2B5EF4-FFF2-40B4-BE49-F238E27FC236}">
+                    <a16:creationId xmlns:a16="http://schemas.microsoft.com/office/drawing/2014/main" id="{B2295775-CFA9-42DF-A8C1-823D0CCE0A49}"/>
+                  </a:ext>
+                </a:extLst>
+              </p:cNvPr>
+              <p:cNvSpPr/>
+              <p:nvPr/>
+            </p:nvSpPr>
+            <p:spPr>
+              <a:xfrm>
+                <a:off x="4963552" y="3436430"/>
+                <a:ext cx="1938075" cy="1118120"/>
+              </a:xfrm>
+              <a:prstGeom prst="rect">
+                <a:avLst/>
+              </a:prstGeom>
+              <a:noFill/>
+              <a:ln w="19050">
+                <a:solidFill>
+                  <a:schemeClr val="tx1"/>
+                </a:solidFill>
+              </a:ln>
+            </p:spPr>
+            <p:style>
+              <a:lnRef idx="2">
+                <a:schemeClr val="accent1">
+                  <a:shade val="50000"/>
+                </a:schemeClr>
+              </a:lnRef>
+              <a:fillRef idx="1">
+                <a:schemeClr val="accent1"/>
+              </a:fillRef>
+              <a:effectRef idx="0">
+                <a:schemeClr val="accent1"/>
+              </a:effectRef>
+              <a:fontRef idx="minor">
+                <a:schemeClr val="lt1"/>
+              </a:fontRef>
+            </p:style>
+            <p:txBody>
+              <a:bodyPr rtlCol="0" anchor="ctr"/>
+              <a:lstStyle/>
+              <a:p>
+                <a:pPr algn="ctr"/>
+                <a:endParaRPr lang="ko-KR" altLang="en-US"/>
+              </a:p>
+            </p:txBody>
+          </p:sp>
+          <p:cxnSp>
+            <p:nvCxnSpPr>
+              <p:cNvPr id="6" name="직선 화살표 연결선 5">
+                <a:extLst>
+                  <a:ext uri="{FF2B5EF4-FFF2-40B4-BE49-F238E27FC236}">
+                    <a16:creationId xmlns:a16="http://schemas.microsoft.com/office/drawing/2014/main" id="{D6F6C469-0FDA-439D-9B10-4D283AD6355B}"/>
+                  </a:ext>
+                </a:extLst>
+              </p:cNvPr>
+              <p:cNvCxnSpPr/>
+              <p:nvPr/>
+            </p:nvCxnSpPr>
+            <p:spPr>
+              <a:xfrm flipH="1">
+                <a:off x="6901627" y="3764657"/>
+                <a:ext cx="1633491" cy="0"/>
+              </a:xfrm>
+              <a:prstGeom prst="straightConnector1">
+                <a:avLst/>
+              </a:prstGeom>
+              <a:ln w="19050">
+                <a:solidFill>
+                  <a:schemeClr val="tx1"/>
+                </a:solidFill>
+                <a:tailEnd type="triangle"/>
+              </a:ln>
+            </p:spPr>
+            <p:style>
+              <a:lnRef idx="1">
+                <a:schemeClr val="accent1"/>
+              </a:lnRef>
+              <a:fillRef idx="0">
+                <a:schemeClr val="accent1"/>
+              </a:fillRef>
+              <a:effectRef idx="0">
+                <a:schemeClr val="accent1"/>
+              </a:effectRef>
+              <a:fontRef idx="minor">
+                <a:schemeClr val="tx1"/>
+              </a:fontRef>
+            </p:style>
+          </p:cxnSp>
+          <p:sp>
+            <p:nvSpPr>
+              <p:cNvPr id="7" name="TextBox 6">
+                <a:extLst>
+                  <a:ext uri="{FF2B5EF4-FFF2-40B4-BE49-F238E27FC236}">
+                    <a16:creationId xmlns:a16="http://schemas.microsoft.com/office/drawing/2014/main" id="{13AE919B-EDD7-41A2-A60E-CA09E0CF7EC4}"/>
+                  </a:ext>
+                </a:extLst>
+              </p:cNvPr>
+              <p:cNvSpPr txBox="1"/>
+              <p:nvPr/>
+            </p:nvSpPr>
+            <p:spPr>
+              <a:xfrm>
+                <a:off x="5406304" y="3764657"/>
+                <a:ext cx="1052570" cy="1569660"/>
+              </a:xfrm>
+              <a:prstGeom prst="rect">
+                <a:avLst/>
+              </a:prstGeom>
+              <a:noFill/>
+            </p:spPr>
+            <p:txBody>
+              <a:bodyPr wrap="square" rtlCol="0">
+                <a:spAutoFit/>
+              </a:bodyPr>
+              <a:lstStyle/>
+              <a:p>
+                <a:pPr algn="ctr"/>
+                <a:r>
+                  <a:rPr lang="en-US" altLang="ko-KR" sz="2400" dirty="0" err="1"/>
+                  <a:t>LineAnd</a:t>
+                </a:r>
+                <a:r>
+                  <a:rPr lang="en-US" altLang="ko-KR" sz="2400" dirty="0"/>
+                  <a:t> Detector</a:t>
+                </a:r>
+                <a:endParaRPr lang="ko-KR" altLang="en-US" sz="2400" dirty="0"/>
+              </a:p>
+            </p:txBody>
+          </p:sp>
+          <p:cxnSp>
+            <p:nvCxnSpPr>
+              <p:cNvPr id="8" name="직선 화살표 연결선 7">
+                <a:extLst>
+                  <a:ext uri="{FF2B5EF4-FFF2-40B4-BE49-F238E27FC236}">
+                    <a16:creationId xmlns:a16="http://schemas.microsoft.com/office/drawing/2014/main" id="{F22ECCEA-BFAE-4537-B3BC-1D1627A7F586}"/>
+                  </a:ext>
+                </a:extLst>
+              </p:cNvPr>
+              <p:cNvCxnSpPr/>
+              <p:nvPr/>
+            </p:nvCxnSpPr>
+            <p:spPr>
+              <a:xfrm flipH="1">
+                <a:off x="6901626" y="4000094"/>
+                <a:ext cx="1633491" cy="0"/>
+              </a:xfrm>
+              <a:prstGeom prst="straightConnector1">
+                <a:avLst/>
+              </a:prstGeom>
+              <a:ln w="19050">
+                <a:solidFill>
+                  <a:schemeClr val="tx1"/>
+                </a:solidFill>
+                <a:tailEnd type="triangle"/>
+              </a:ln>
+            </p:spPr>
+            <p:style>
+              <a:lnRef idx="1">
+                <a:schemeClr val="accent1"/>
+              </a:lnRef>
+              <a:fillRef idx="0">
+                <a:schemeClr val="accent1"/>
+              </a:fillRef>
+              <a:effectRef idx="0">
+                <a:schemeClr val="accent1"/>
+              </a:effectRef>
+              <a:fontRef idx="minor">
+                <a:schemeClr val="tx1"/>
+              </a:fontRef>
+            </p:style>
+          </p:cxnSp>
+          <p:cxnSp>
+            <p:nvCxnSpPr>
+              <p:cNvPr id="9" name="직선 화살표 연결선 8">
+                <a:extLst>
+                  <a:ext uri="{FF2B5EF4-FFF2-40B4-BE49-F238E27FC236}">
+                    <a16:creationId xmlns:a16="http://schemas.microsoft.com/office/drawing/2014/main" id="{84A9BF5F-8314-439E-8A13-22A7752F02C0}"/>
+                  </a:ext>
+                </a:extLst>
+              </p:cNvPr>
+              <p:cNvCxnSpPr/>
+              <p:nvPr/>
+            </p:nvCxnSpPr>
+            <p:spPr>
+              <a:xfrm flipH="1">
+                <a:off x="6901625" y="4226322"/>
+                <a:ext cx="1633491" cy="0"/>
+              </a:xfrm>
+              <a:prstGeom prst="straightConnector1">
+                <a:avLst/>
+              </a:prstGeom>
+              <a:ln w="19050">
+                <a:solidFill>
+                  <a:schemeClr val="tx1"/>
+                </a:solidFill>
+                <a:tailEnd type="triangle"/>
+              </a:ln>
+            </p:spPr>
+            <p:style>
+              <a:lnRef idx="1">
+                <a:schemeClr val="accent1"/>
+              </a:lnRef>
+              <a:fillRef idx="0">
+                <a:schemeClr val="accent1"/>
+              </a:fillRef>
+              <a:effectRef idx="0">
+                <a:schemeClr val="accent1"/>
+              </a:effectRef>
+              <a:fontRef idx="minor">
+                <a:schemeClr val="tx1"/>
+              </a:fontRef>
+            </p:style>
+          </p:cxnSp>
+          <p:sp>
+            <p:nvSpPr>
+              <p:cNvPr id="10" name="TextBox 9">
+                <a:extLst>
+                  <a:ext uri="{FF2B5EF4-FFF2-40B4-BE49-F238E27FC236}">
+                    <a16:creationId xmlns:a16="http://schemas.microsoft.com/office/drawing/2014/main" id="{980667EC-ACFB-410F-95A8-A220418229D5}"/>
+                  </a:ext>
+                </a:extLst>
+              </p:cNvPr>
+              <p:cNvSpPr txBox="1"/>
+              <p:nvPr/>
+            </p:nvSpPr>
+            <p:spPr>
+              <a:xfrm>
+                <a:off x="8535116" y="3630763"/>
+                <a:ext cx="814647" cy="276999"/>
+              </a:xfrm>
+              <a:prstGeom prst="rect">
+                <a:avLst/>
+              </a:prstGeom>
+              <a:noFill/>
+            </p:spPr>
+            <p:txBody>
+              <a:bodyPr wrap="none" rtlCol="0">
+                <a:spAutoFit/>
+              </a:bodyPr>
+              <a:lstStyle/>
+              <a:p>
+                <a:r>
+                  <a:rPr lang="en-US" altLang="ko-KR" sz="1200" dirty="0"/>
+                  <a:t>random1</a:t>
+                </a:r>
+                <a:endParaRPr lang="ko-KR" altLang="en-US" sz="1200" dirty="0"/>
+              </a:p>
+            </p:txBody>
+          </p:sp>
+          <p:sp>
+            <p:nvSpPr>
+              <p:cNvPr id="11" name="TextBox 10">
+                <a:extLst>
+                  <a:ext uri="{FF2B5EF4-FFF2-40B4-BE49-F238E27FC236}">
+                    <a16:creationId xmlns:a16="http://schemas.microsoft.com/office/drawing/2014/main" id="{AEF70ACD-3B72-46DC-9971-B1E6F5FCCDD3}"/>
+                  </a:ext>
+                </a:extLst>
+              </p:cNvPr>
+              <p:cNvSpPr txBox="1"/>
+              <p:nvPr/>
+            </p:nvSpPr>
+            <p:spPr>
+              <a:xfrm>
+                <a:off x="8535116" y="3852385"/>
+                <a:ext cx="814647" cy="276999"/>
+              </a:xfrm>
+              <a:prstGeom prst="rect">
+                <a:avLst/>
+              </a:prstGeom>
+              <a:noFill/>
+            </p:spPr>
+            <p:txBody>
+              <a:bodyPr wrap="none" rtlCol="0">
+                <a:spAutoFit/>
+              </a:bodyPr>
+              <a:lstStyle/>
+              <a:p>
+                <a:r>
+                  <a:rPr lang="en-US" altLang="ko-KR" sz="1200" dirty="0"/>
+                  <a:t>random2</a:t>
+                </a:r>
+                <a:endParaRPr lang="ko-KR" altLang="en-US" sz="1200" dirty="0"/>
+              </a:p>
+            </p:txBody>
+          </p:sp>
+          <p:sp>
+            <p:nvSpPr>
+              <p:cNvPr id="12" name="TextBox 11">
+                <a:extLst>
+                  <a:ext uri="{FF2B5EF4-FFF2-40B4-BE49-F238E27FC236}">
+                    <a16:creationId xmlns:a16="http://schemas.microsoft.com/office/drawing/2014/main" id="{BE5D4894-C676-4422-AB77-4A8DA5EC403B}"/>
+                  </a:ext>
+                </a:extLst>
+              </p:cNvPr>
+              <p:cNvSpPr txBox="1"/>
+              <p:nvPr/>
+            </p:nvSpPr>
+            <p:spPr>
+              <a:xfrm>
+                <a:off x="8535115" y="4092427"/>
+                <a:ext cx="814647" cy="276999"/>
+              </a:xfrm>
+              <a:prstGeom prst="rect">
+                <a:avLst/>
+              </a:prstGeom>
+              <a:noFill/>
+            </p:spPr>
+            <p:txBody>
+              <a:bodyPr wrap="none" rtlCol="0">
+                <a:spAutoFit/>
+              </a:bodyPr>
+              <a:lstStyle/>
+              <a:p>
+                <a:r>
+                  <a:rPr lang="en-US" altLang="ko-KR" sz="1200" dirty="0"/>
+                  <a:t>random3</a:t>
+                </a:r>
+                <a:endParaRPr lang="ko-KR" altLang="en-US" sz="1200" dirty="0"/>
+              </a:p>
+            </p:txBody>
+          </p:sp>
+          <p:sp>
+            <p:nvSpPr>
+              <p:cNvPr id="13" name="이등변 삼각형 12">
+                <a:extLst>
+                  <a:ext uri="{FF2B5EF4-FFF2-40B4-BE49-F238E27FC236}">
+                    <a16:creationId xmlns:a16="http://schemas.microsoft.com/office/drawing/2014/main" id="{594D4047-258A-40C2-8A20-997034925B4C}"/>
+                  </a:ext>
+                </a:extLst>
+              </p:cNvPr>
+              <p:cNvSpPr/>
+              <p:nvPr/>
+            </p:nvSpPr>
+            <p:spPr>
+              <a:xfrm>
+                <a:off x="5772188" y="4277995"/>
+                <a:ext cx="320802" cy="276554"/>
+              </a:xfrm>
+              <a:prstGeom prst="triangle">
+                <a:avLst/>
+              </a:prstGeom>
+              <a:noFill/>
+              <a:ln w="19050">
+                <a:solidFill>
+                  <a:schemeClr val="tx1"/>
+                </a:solidFill>
+              </a:ln>
+            </p:spPr>
+            <p:style>
+              <a:lnRef idx="2">
+                <a:schemeClr val="accent1">
+                  <a:shade val="50000"/>
+                </a:schemeClr>
+              </a:lnRef>
+              <a:fillRef idx="1">
+                <a:schemeClr val="accent1"/>
+              </a:fillRef>
+              <a:effectRef idx="0">
+                <a:schemeClr val="accent1"/>
+              </a:effectRef>
+              <a:fontRef idx="minor">
+                <a:schemeClr val="lt1"/>
+              </a:fontRef>
+            </p:style>
+            <p:txBody>
+              <a:bodyPr rtlCol="0" anchor="ctr"/>
+              <a:lstStyle/>
+              <a:p>
+                <a:pPr algn="ctr"/>
+                <a:endParaRPr lang="ko-KR" altLang="en-US"/>
+              </a:p>
+            </p:txBody>
+          </p:sp>
+          <p:cxnSp>
+            <p:nvCxnSpPr>
+              <p:cNvPr id="14" name="연결선: 꺾임 13">
+                <a:extLst>
+                  <a:ext uri="{FF2B5EF4-FFF2-40B4-BE49-F238E27FC236}">
+                    <a16:creationId xmlns:a16="http://schemas.microsoft.com/office/drawing/2014/main" id="{F1EB4FF6-9564-4DF5-AB1D-35F5FF21DA21}"/>
+                  </a:ext>
+                </a:extLst>
+              </p:cNvPr>
+              <p:cNvCxnSpPr>
+                <a:cxnSpLocks/>
+                <a:stCxn id="13" idx="3"/>
+                <a:endCxn id="15" idx="1"/>
+              </p:cNvCxnSpPr>
+              <p:nvPr/>
+            </p:nvCxnSpPr>
+            <p:spPr>
+              <a:xfrm rot="16200000" flipH="1">
+                <a:off x="7141551" y="3345586"/>
+                <a:ext cx="184600" cy="2602525"/>
+              </a:xfrm>
+              <a:prstGeom prst="bentConnector2">
+                <a:avLst/>
+              </a:prstGeom>
+              <a:ln w="19050">
+                <a:solidFill>
+                  <a:schemeClr val="tx1"/>
+                </a:solidFill>
+                <a:headEnd type="triangle"/>
+                <a:tailEnd type="none"/>
+              </a:ln>
+            </p:spPr>
+            <p:style>
+              <a:lnRef idx="1">
+                <a:schemeClr val="accent1"/>
+              </a:lnRef>
+              <a:fillRef idx="0">
+                <a:schemeClr val="accent1"/>
+              </a:fillRef>
+              <a:effectRef idx="0">
+                <a:schemeClr val="accent1"/>
+              </a:effectRef>
+              <a:fontRef idx="minor">
+                <a:schemeClr val="tx1"/>
+              </a:fontRef>
+            </p:style>
+          </p:cxnSp>
+          <p:sp>
+            <p:nvSpPr>
+              <p:cNvPr id="15" name="TextBox 14">
+                <a:extLst>
+                  <a:ext uri="{FF2B5EF4-FFF2-40B4-BE49-F238E27FC236}">
+                    <a16:creationId xmlns:a16="http://schemas.microsoft.com/office/drawing/2014/main" id="{6BC706F4-1CA5-4109-B476-5ECE21735BFF}"/>
+                  </a:ext>
+                </a:extLst>
+              </p:cNvPr>
+              <p:cNvSpPr txBox="1"/>
+              <p:nvPr/>
+            </p:nvSpPr>
+            <p:spPr>
+              <a:xfrm>
+                <a:off x="8535114" y="4600649"/>
+                <a:ext cx="538930" cy="276999"/>
+              </a:xfrm>
+              <a:prstGeom prst="rect">
+                <a:avLst/>
+              </a:prstGeom>
+              <a:noFill/>
+            </p:spPr>
+            <p:txBody>
+              <a:bodyPr wrap="none" rtlCol="0">
+                <a:spAutoFit/>
+              </a:bodyPr>
+              <a:lstStyle/>
+              <a:p>
+                <a:r>
+                  <a:rPr lang="en-US" altLang="ko-KR" sz="1200" dirty="0"/>
+                  <a:t>clock</a:t>
+                </a:r>
+                <a:endParaRPr lang="ko-KR" altLang="en-US" sz="1200" dirty="0"/>
+              </a:p>
+            </p:txBody>
+          </p:sp>
+          <p:grpSp>
+            <p:nvGrpSpPr>
+              <p:cNvPr id="16" name="그룹 15">
+                <a:extLst>
+                  <a:ext uri="{FF2B5EF4-FFF2-40B4-BE49-F238E27FC236}">
+                    <a16:creationId xmlns:a16="http://schemas.microsoft.com/office/drawing/2014/main" id="{F41DC55A-A71E-42AF-BC3D-64BDAD8DEE9D}"/>
+                  </a:ext>
+                </a:extLst>
+              </p:cNvPr>
+              <p:cNvGrpSpPr/>
+              <p:nvPr/>
+            </p:nvGrpSpPr>
+            <p:grpSpPr>
+              <a:xfrm>
+                <a:off x="2465718" y="3555645"/>
+                <a:ext cx="2497832" cy="276998"/>
+                <a:chOff x="828551" y="1862829"/>
+                <a:chExt cx="2497832" cy="276998"/>
+              </a:xfrm>
+            </p:grpSpPr>
+            <p:cxnSp>
+              <p:nvCxnSpPr>
+                <p:cNvPr id="27" name="직선 화살표 연결선 26">
+                  <a:extLst>
+                    <a:ext uri="{FF2B5EF4-FFF2-40B4-BE49-F238E27FC236}">
+                      <a16:creationId xmlns:a16="http://schemas.microsoft.com/office/drawing/2014/main" id="{E1C83047-E2C9-4D31-8965-DA84042048F1}"/>
+                    </a:ext>
+                  </a:extLst>
+                </p:cNvPr>
+                <p:cNvCxnSpPr/>
+                <p:nvPr/>
+              </p:nvCxnSpPr>
+              <p:spPr>
+                <a:xfrm flipH="1">
+                  <a:off x="1692892" y="2001328"/>
+                  <a:ext cx="1633491" cy="0"/>
+                </a:xfrm>
+                <a:prstGeom prst="straightConnector1">
+                  <a:avLst/>
+                </a:prstGeom>
+                <a:ln w="57150">
+                  <a:solidFill>
+                    <a:schemeClr val="tx1"/>
+                  </a:solidFill>
+                  <a:tailEnd type="triangle"/>
+                </a:ln>
+              </p:spPr>
+              <p:style>
+                <a:lnRef idx="1">
+                  <a:schemeClr val="accent1"/>
+                </a:lnRef>
+                <a:fillRef idx="0">
+                  <a:schemeClr val="accent1"/>
+                </a:fillRef>
+                <a:effectRef idx="0">
+                  <a:schemeClr val="accent1"/>
+                </a:effectRef>
+                <a:fontRef idx="minor">
+                  <a:schemeClr val="tx1"/>
+                </a:fontRef>
+              </p:style>
+            </p:cxnSp>
+            <p:sp>
+              <p:nvSpPr>
+                <p:cNvPr id="28" name="TextBox 27">
+                  <a:extLst>
+                    <a:ext uri="{FF2B5EF4-FFF2-40B4-BE49-F238E27FC236}">
+                      <a16:creationId xmlns:a16="http://schemas.microsoft.com/office/drawing/2014/main" id="{F265217E-935A-4632-8BBE-84182AC497A9}"/>
+                    </a:ext>
+                  </a:extLst>
+                </p:cNvPr>
+                <p:cNvSpPr txBox="1"/>
+                <p:nvPr/>
+              </p:nvSpPr>
+              <p:spPr>
+                <a:xfrm>
+                  <a:off x="828551" y="1862829"/>
+                  <a:ext cx="864340" cy="276998"/>
+                </a:xfrm>
+                <a:prstGeom prst="rect">
+                  <a:avLst/>
+                </a:prstGeom>
+                <a:noFill/>
+              </p:spPr>
+              <p:txBody>
+                <a:bodyPr wrap="square" rtlCol="0">
+                  <a:spAutoFit/>
+                </a:bodyPr>
+                <a:lstStyle/>
+                <a:p>
+                  <a:r>
+                    <a:rPr lang="en-US" altLang="ko-KR" sz="1200" dirty="0"/>
+                    <a:t>line1[7:0]</a:t>
+                  </a:r>
+                  <a:endParaRPr lang="ko-KR" altLang="en-US" sz="1200" dirty="0"/>
+                </a:p>
+              </p:txBody>
+            </p:sp>
+            <p:cxnSp>
+              <p:nvCxnSpPr>
+                <p:cNvPr id="29" name="직선 연결선 28">
+                  <a:extLst>
+                    <a:ext uri="{FF2B5EF4-FFF2-40B4-BE49-F238E27FC236}">
+                      <a16:creationId xmlns:a16="http://schemas.microsoft.com/office/drawing/2014/main" id="{5802C079-1FF6-4839-B552-DD5DB02B1BB4}"/>
+                    </a:ext>
+                  </a:extLst>
+                </p:cNvPr>
+                <p:cNvCxnSpPr>
+                  <a:cxnSpLocks/>
+                </p:cNvCxnSpPr>
+                <p:nvPr/>
+              </p:nvCxnSpPr>
+              <p:spPr>
+                <a:xfrm flipH="1">
+                  <a:off x="2450751" y="1908451"/>
+                  <a:ext cx="92596" cy="186129"/>
+                </a:xfrm>
+                <a:prstGeom prst="line">
+                  <a:avLst/>
+                </a:prstGeom>
+                <a:ln w="19050">
+                  <a:solidFill>
+                    <a:schemeClr val="tx1"/>
+                  </a:solidFill>
+                </a:ln>
+              </p:spPr>
+              <p:style>
+                <a:lnRef idx="1">
+                  <a:schemeClr val="accent1"/>
+                </a:lnRef>
+                <a:fillRef idx="0">
+                  <a:schemeClr val="accent1"/>
+                </a:fillRef>
+                <a:effectRef idx="0">
+                  <a:schemeClr val="accent1"/>
+                </a:effectRef>
+                <a:fontRef idx="minor">
+                  <a:schemeClr val="tx1"/>
+                </a:fontRef>
+              </p:style>
+            </p:cxnSp>
+          </p:grpSp>
+          <p:grpSp>
+            <p:nvGrpSpPr>
+              <p:cNvPr id="17" name="그룹 16">
+                <a:extLst>
+                  <a:ext uri="{FF2B5EF4-FFF2-40B4-BE49-F238E27FC236}">
+                    <a16:creationId xmlns:a16="http://schemas.microsoft.com/office/drawing/2014/main" id="{5D170498-8E9C-472C-9849-1A11B2AE770D}"/>
+                  </a:ext>
+                </a:extLst>
+              </p:cNvPr>
+              <p:cNvGrpSpPr/>
+              <p:nvPr/>
+            </p:nvGrpSpPr>
+            <p:grpSpPr>
+              <a:xfrm>
+                <a:off x="2465718" y="3810258"/>
+                <a:ext cx="2497832" cy="276998"/>
+                <a:chOff x="828551" y="1862829"/>
+                <a:chExt cx="2497832" cy="276998"/>
+              </a:xfrm>
+            </p:grpSpPr>
+            <p:cxnSp>
+              <p:nvCxnSpPr>
+                <p:cNvPr id="24" name="직선 화살표 연결선 23">
+                  <a:extLst>
+                    <a:ext uri="{FF2B5EF4-FFF2-40B4-BE49-F238E27FC236}">
+                      <a16:creationId xmlns:a16="http://schemas.microsoft.com/office/drawing/2014/main" id="{456D6088-08D4-4157-9E34-C3EC9FE64B1F}"/>
+                    </a:ext>
+                  </a:extLst>
+                </p:cNvPr>
+                <p:cNvCxnSpPr/>
+                <p:nvPr/>
+              </p:nvCxnSpPr>
+              <p:spPr>
+                <a:xfrm flipH="1">
+                  <a:off x="1692892" y="2001328"/>
+                  <a:ext cx="1633491" cy="0"/>
+                </a:xfrm>
+                <a:prstGeom prst="straightConnector1">
+                  <a:avLst/>
+                </a:prstGeom>
+                <a:ln w="57150">
+                  <a:solidFill>
+                    <a:schemeClr val="tx1"/>
+                  </a:solidFill>
+                  <a:tailEnd type="triangle"/>
+                </a:ln>
+              </p:spPr>
+              <p:style>
+                <a:lnRef idx="1">
+                  <a:schemeClr val="accent1"/>
+                </a:lnRef>
+                <a:fillRef idx="0">
+                  <a:schemeClr val="accent1"/>
+                </a:fillRef>
+                <a:effectRef idx="0">
+                  <a:schemeClr val="accent1"/>
+                </a:effectRef>
+                <a:fontRef idx="minor">
+                  <a:schemeClr val="tx1"/>
+                </a:fontRef>
+              </p:style>
+            </p:cxnSp>
+            <p:sp>
+              <p:nvSpPr>
+                <p:cNvPr id="25" name="TextBox 24">
+                  <a:extLst>
+                    <a:ext uri="{FF2B5EF4-FFF2-40B4-BE49-F238E27FC236}">
+                      <a16:creationId xmlns:a16="http://schemas.microsoft.com/office/drawing/2014/main" id="{FC8028D8-A94A-4554-BA4E-C1D064648F22}"/>
+                    </a:ext>
+                  </a:extLst>
+                </p:cNvPr>
+                <p:cNvSpPr txBox="1"/>
+                <p:nvPr/>
+              </p:nvSpPr>
+              <p:spPr>
+                <a:xfrm>
+                  <a:off x="828551" y="1862829"/>
+                  <a:ext cx="864340" cy="276998"/>
+                </a:xfrm>
+                <a:prstGeom prst="rect">
+                  <a:avLst/>
+                </a:prstGeom>
+                <a:noFill/>
+              </p:spPr>
+              <p:txBody>
+                <a:bodyPr wrap="square" rtlCol="0">
+                  <a:spAutoFit/>
+                </a:bodyPr>
+                <a:lstStyle/>
+                <a:p>
+                  <a:r>
+                    <a:rPr lang="en-US" altLang="ko-KR" sz="1200" dirty="0"/>
+                    <a:t>line2[7:0]</a:t>
+                  </a:r>
+                  <a:endParaRPr lang="ko-KR" altLang="en-US" sz="1200" dirty="0"/>
+                </a:p>
+              </p:txBody>
+            </p:sp>
+            <p:cxnSp>
+              <p:nvCxnSpPr>
+                <p:cNvPr id="26" name="직선 연결선 25">
+                  <a:extLst>
+                    <a:ext uri="{FF2B5EF4-FFF2-40B4-BE49-F238E27FC236}">
+                      <a16:creationId xmlns:a16="http://schemas.microsoft.com/office/drawing/2014/main" id="{5D6844B6-F05A-4637-9014-C113038D54EA}"/>
+                    </a:ext>
+                  </a:extLst>
+                </p:cNvPr>
+                <p:cNvCxnSpPr>
+                  <a:cxnSpLocks/>
+                </p:cNvCxnSpPr>
+                <p:nvPr/>
+              </p:nvCxnSpPr>
+              <p:spPr>
+                <a:xfrm flipH="1">
+                  <a:off x="2450751" y="1908451"/>
+                  <a:ext cx="92596" cy="186129"/>
+                </a:xfrm>
+                <a:prstGeom prst="line">
+                  <a:avLst/>
+                </a:prstGeom>
+                <a:ln w="19050">
+                  <a:solidFill>
+                    <a:schemeClr val="tx1"/>
+                  </a:solidFill>
+                </a:ln>
+              </p:spPr>
+              <p:style>
+                <a:lnRef idx="1">
+                  <a:schemeClr val="accent1"/>
+                </a:lnRef>
+                <a:fillRef idx="0">
+                  <a:schemeClr val="accent1"/>
+                </a:fillRef>
+                <a:effectRef idx="0">
+                  <a:schemeClr val="accent1"/>
+                </a:effectRef>
+                <a:fontRef idx="minor">
+                  <a:schemeClr val="tx1"/>
+                </a:fontRef>
+              </p:style>
+            </p:cxnSp>
+          </p:grpSp>
+          <p:grpSp>
+            <p:nvGrpSpPr>
+              <p:cNvPr id="18" name="그룹 17">
+                <a:extLst>
+                  <a:ext uri="{FF2B5EF4-FFF2-40B4-BE49-F238E27FC236}">
+                    <a16:creationId xmlns:a16="http://schemas.microsoft.com/office/drawing/2014/main" id="{588B39BD-CA5D-49F7-B07F-7F6F489BAA4F}"/>
+                  </a:ext>
+                </a:extLst>
+              </p:cNvPr>
+              <p:cNvGrpSpPr/>
+              <p:nvPr/>
+            </p:nvGrpSpPr>
+            <p:grpSpPr>
+              <a:xfrm>
+                <a:off x="2465719" y="4064872"/>
+                <a:ext cx="2497832" cy="276998"/>
+                <a:chOff x="828551" y="1862829"/>
+                <a:chExt cx="2497832" cy="276998"/>
+              </a:xfrm>
+            </p:grpSpPr>
+            <p:cxnSp>
+              <p:nvCxnSpPr>
+                <p:cNvPr id="21" name="직선 화살표 연결선 20">
+                  <a:extLst>
+                    <a:ext uri="{FF2B5EF4-FFF2-40B4-BE49-F238E27FC236}">
+                      <a16:creationId xmlns:a16="http://schemas.microsoft.com/office/drawing/2014/main" id="{9E9F4C63-F89F-4BC2-8078-71F7A45144A1}"/>
+                    </a:ext>
+                  </a:extLst>
+                </p:cNvPr>
+                <p:cNvCxnSpPr/>
+                <p:nvPr/>
+              </p:nvCxnSpPr>
+              <p:spPr>
+                <a:xfrm flipH="1">
+                  <a:off x="1692892" y="2001328"/>
+                  <a:ext cx="1633491" cy="0"/>
+                </a:xfrm>
+                <a:prstGeom prst="straightConnector1">
+                  <a:avLst/>
+                </a:prstGeom>
+                <a:ln w="57150">
+                  <a:solidFill>
+                    <a:schemeClr val="tx1"/>
+                  </a:solidFill>
+                  <a:tailEnd type="triangle"/>
+                </a:ln>
+              </p:spPr>
+              <p:style>
+                <a:lnRef idx="1">
+                  <a:schemeClr val="accent1"/>
+                </a:lnRef>
+                <a:fillRef idx="0">
+                  <a:schemeClr val="accent1"/>
+                </a:fillRef>
+                <a:effectRef idx="0">
+                  <a:schemeClr val="accent1"/>
+                </a:effectRef>
+                <a:fontRef idx="minor">
+                  <a:schemeClr val="tx1"/>
+                </a:fontRef>
+              </p:style>
+            </p:cxnSp>
+            <p:sp>
+              <p:nvSpPr>
+                <p:cNvPr id="22" name="TextBox 21">
+                  <a:extLst>
+                    <a:ext uri="{FF2B5EF4-FFF2-40B4-BE49-F238E27FC236}">
+                      <a16:creationId xmlns:a16="http://schemas.microsoft.com/office/drawing/2014/main" id="{122F0E0F-7DDB-4BC9-B74D-5AA834A31CEA}"/>
+                    </a:ext>
+                  </a:extLst>
+                </p:cNvPr>
+                <p:cNvSpPr txBox="1"/>
+                <p:nvPr/>
+              </p:nvSpPr>
+              <p:spPr>
+                <a:xfrm>
+                  <a:off x="828551" y="1862829"/>
+                  <a:ext cx="864340" cy="276998"/>
+                </a:xfrm>
+                <a:prstGeom prst="rect">
+                  <a:avLst/>
+                </a:prstGeom>
+                <a:noFill/>
+              </p:spPr>
+              <p:txBody>
+                <a:bodyPr wrap="square" rtlCol="0">
+                  <a:spAutoFit/>
+                </a:bodyPr>
+                <a:lstStyle/>
+                <a:p>
+                  <a:r>
+                    <a:rPr lang="en-US" altLang="ko-KR" sz="1200" dirty="0"/>
+                    <a:t>line3[7:0]</a:t>
+                  </a:r>
+                  <a:endParaRPr lang="ko-KR" altLang="en-US" sz="1200" dirty="0"/>
+                </a:p>
+              </p:txBody>
+            </p:sp>
+            <p:cxnSp>
+              <p:nvCxnSpPr>
+                <p:cNvPr id="23" name="직선 연결선 22">
+                  <a:extLst>
+                    <a:ext uri="{FF2B5EF4-FFF2-40B4-BE49-F238E27FC236}">
+                      <a16:creationId xmlns:a16="http://schemas.microsoft.com/office/drawing/2014/main" id="{B0324639-9B0A-4E29-A32E-765C53D0EC76}"/>
+                    </a:ext>
+                  </a:extLst>
+                </p:cNvPr>
+                <p:cNvCxnSpPr>
+                  <a:cxnSpLocks/>
+                </p:cNvCxnSpPr>
+                <p:nvPr/>
+              </p:nvCxnSpPr>
+              <p:spPr>
+                <a:xfrm flipH="1">
+                  <a:off x="2450751" y="1908451"/>
+                  <a:ext cx="92596" cy="186129"/>
+                </a:xfrm>
+                <a:prstGeom prst="line">
+                  <a:avLst/>
+                </a:prstGeom>
+                <a:ln w="19050">
+                  <a:solidFill>
+                    <a:schemeClr val="tx1"/>
+                  </a:solidFill>
+                </a:ln>
+              </p:spPr>
+              <p:style>
+                <a:lnRef idx="1">
+                  <a:schemeClr val="accent1"/>
+                </a:lnRef>
+                <a:fillRef idx="0">
+                  <a:schemeClr val="accent1"/>
+                </a:fillRef>
+                <a:effectRef idx="0">
+                  <a:schemeClr val="accent1"/>
+                </a:effectRef>
+                <a:fontRef idx="minor">
+                  <a:schemeClr val="tx1"/>
+                </a:fontRef>
+              </p:style>
+            </p:cxnSp>
+          </p:grpSp>
+          <p:grpSp>
+            <p:nvGrpSpPr>
+              <p:cNvPr id="30" name="그룹 29">
+                <a:extLst>
+                  <a:ext uri="{FF2B5EF4-FFF2-40B4-BE49-F238E27FC236}">
+                    <a16:creationId xmlns:a16="http://schemas.microsoft.com/office/drawing/2014/main" id="{0C1FEAB6-C182-4EAE-AAAC-6A5A2B2594F6}"/>
+                  </a:ext>
+                </a:extLst>
+              </p:cNvPr>
+              <p:cNvGrpSpPr/>
+              <p:nvPr/>
+            </p:nvGrpSpPr>
+            <p:grpSpPr>
+              <a:xfrm>
+                <a:off x="6417108" y="3056116"/>
+                <a:ext cx="2463982" cy="389525"/>
+                <a:chOff x="6417108" y="3056116"/>
+                <a:chExt cx="2463982" cy="389525"/>
+              </a:xfrm>
+            </p:grpSpPr>
+            <p:cxnSp>
+              <p:nvCxnSpPr>
+                <p:cNvPr id="19" name="연결선: 꺾임 18">
+                  <a:extLst>
+                    <a:ext uri="{FF2B5EF4-FFF2-40B4-BE49-F238E27FC236}">
+                      <a16:creationId xmlns:a16="http://schemas.microsoft.com/office/drawing/2014/main" id="{F0F01E25-EB0F-4D5C-B6BC-49D8B2D4A905}"/>
+                    </a:ext>
+                  </a:extLst>
+                </p:cNvPr>
+                <p:cNvCxnSpPr>
+                  <a:cxnSpLocks/>
+                </p:cNvCxnSpPr>
+                <p:nvPr/>
+              </p:nvCxnSpPr>
+              <p:spPr>
+                <a:xfrm flipV="1">
+                  <a:off x="6417108" y="3188214"/>
+                  <a:ext cx="2118006" cy="257427"/>
+                </a:xfrm>
+                <a:prstGeom prst="bentConnector3">
+                  <a:avLst>
+                    <a:gd name="adj1" fmla="val 55"/>
+                  </a:avLst>
+                </a:prstGeom>
+                <a:ln w="19050">
+                  <a:solidFill>
+                    <a:schemeClr val="tx1"/>
+                  </a:solidFill>
+                  <a:headEnd type="triangle"/>
+                  <a:tailEnd type="none"/>
+                </a:ln>
+              </p:spPr>
+              <p:style>
+                <a:lnRef idx="1">
+                  <a:schemeClr val="accent1"/>
+                </a:lnRef>
+                <a:fillRef idx="0">
+                  <a:schemeClr val="accent1"/>
+                </a:fillRef>
+                <a:effectRef idx="0">
+                  <a:schemeClr val="accent1"/>
+                </a:effectRef>
+                <a:fontRef idx="minor">
+                  <a:schemeClr val="tx1"/>
+                </a:fontRef>
+              </p:style>
+            </p:cxnSp>
+            <p:sp>
+              <p:nvSpPr>
+                <p:cNvPr id="20" name="TextBox 19">
+                  <a:extLst>
+                    <a:ext uri="{FF2B5EF4-FFF2-40B4-BE49-F238E27FC236}">
+                      <a16:creationId xmlns:a16="http://schemas.microsoft.com/office/drawing/2014/main" id="{4BC14E4A-66B8-4DC2-A7FC-3A72416C16E8}"/>
+                    </a:ext>
+                  </a:extLst>
+                </p:cNvPr>
+                <p:cNvSpPr txBox="1"/>
+                <p:nvPr/>
+              </p:nvSpPr>
+              <p:spPr>
+                <a:xfrm>
+                  <a:off x="8535115" y="3056116"/>
+                  <a:ext cx="345975" cy="189671"/>
+                </a:xfrm>
+                <a:prstGeom prst="rect">
+                  <a:avLst/>
+                </a:prstGeom>
+                <a:noFill/>
+              </p:spPr>
+              <p:txBody>
+                <a:bodyPr wrap="none" rtlCol="0">
+                  <a:spAutoFit/>
+                </a:bodyPr>
+                <a:lstStyle/>
+                <a:p>
+                  <a:r>
+                    <a:rPr lang="en-US" altLang="ko-KR" sz="1200" dirty="0"/>
+                    <a:t>btn3</a:t>
+                  </a:r>
+                  <a:endParaRPr lang="ko-KR" altLang="en-US" sz="1200" dirty="0"/>
+                </a:p>
+              </p:txBody>
+            </p:sp>
+          </p:grpSp>
+          <p:grpSp>
+            <p:nvGrpSpPr>
+              <p:cNvPr id="31" name="그룹 30">
+                <a:extLst>
+                  <a:ext uri="{FF2B5EF4-FFF2-40B4-BE49-F238E27FC236}">
+                    <a16:creationId xmlns:a16="http://schemas.microsoft.com/office/drawing/2014/main" id="{C534477F-1FA4-4AE1-B9E0-BC19D3D726C9}"/>
+                  </a:ext>
+                </a:extLst>
+              </p:cNvPr>
+              <p:cNvGrpSpPr/>
+              <p:nvPr/>
+            </p:nvGrpSpPr>
+            <p:grpSpPr>
+              <a:xfrm>
+                <a:off x="5932589" y="2724269"/>
+                <a:ext cx="2948500" cy="712162"/>
+                <a:chOff x="5932590" y="3056116"/>
+                <a:chExt cx="2948500" cy="712162"/>
+              </a:xfrm>
+            </p:grpSpPr>
+            <p:cxnSp>
+              <p:nvCxnSpPr>
+                <p:cNvPr id="32" name="연결선: 꺾임 31">
+                  <a:extLst>
+                    <a:ext uri="{FF2B5EF4-FFF2-40B4-BE49-F238E27FC236}">
+                      <a16:creationId xmlns:a16="http://schemas.microsoft.com/office/drawing/2014/main" id="{0CEA071D-87FA-4183-8E7A-C2ABE9128F10}"/>
+                    </a:ext>
+                  </a:extLst>
+                </p:cNvPr>
+                <p:cNvCxnSpPr>
+                  <a:cxnSpLocks/>
+                  <a:stCxn id="5" idx="0"/>
+                </p:cNvCxnSpPr>
+                <p:nvPr/>
+              </p:nvCxnSpPr>
+              <p:spPr>
+                <a:xfrm rot="5400000" flipH="1" flipV="1">
+                  <a:off x="6943821" y="2176986"/>
+                  <a:ext cx="580061" cy="2602523"/>
+                </a:xfrm>
+                <a:prstGeom prst="bentConnector2">
+                  <a:avLst/>
+                </a:prstGeom>
+                <a:ln w="19050">
+                  <a:solidFill>
+                    <a:schemeClr val="tx1"/>
+                  </a:solidFill>
+                  <a:headEnd type="triangle"/>
+                  <a:tailEnd type="none"/>
+                </a:ln>
+              </p:spPr>
+              <p:style>
+                <a:lnRef idx="1">
+                  <a:schemeClr val="accent1"/>
+                </a:lnRef>
+                <a:fillRef idx="0">
+                  <a:schemeClr val="accent1"/>
+                </a:fillRef>
+                <a:effectRef idx="0">
+                  <a:schemeClr val="accent1"/>
+                </a:effectRef>
+                <a:fontRef idx="minor">
+                  <a:schemeClr val="tx1"/>
+                </a:fontRef>
+              </p:style>
+            </p:cxnSp>
+            <p:sp>
+              <p:nvSpPr>
+                <p:cNvPr id="33" name="TextBox 32">
+                  <a:extLst>
+                    <a:ext uri="{FF2B5EF4-FFF2-40B4-BE49-F238E27FC236}">
+                      <a16:creationId xmlns:a16="http://schemas.microsoft.com/office/drawing/2014/main" id="{DA501DE9-6FFF-4B63-B90F-3A8A5A8A11F5}"/>
+                    </a:ext>
+                  </a:extLst>
+                </p:cNvPr>
+                <p:cNvSpPr txBox="1"/>
+                <p:nvPr/>
+              </p:nvSpPr>
+              <p:spPr>
+                <a:xfrm>
+                  <a:off x="8535115" y="3056116"/>
+                  <a:ext cx="345975" cy="189671"/>
+                </a:xfrm>
+                <a:prstGeom prst="rect">
+                  <a:avLst/>
+                </a:prstGeom>
+                <a:noFill/>
+              </p:spPr>
+              <p:txBody>
+                <a:bodyPr wrap="none" rtlCol="0">
+                  <a:spAutoFit/>
+                </a:bodyPr>
+                <a:lstStyle/>
+                <a:p>
+                  <a:r>
+                    <a:rPr lang="en-US" altLang="ko-KR" sz="1200" dirty="0"/>
+                    <a:t>btn2</a:t>
+                  </a:r>
+                  <a:endParaRPr lang="ko-KR" altLang="en-US" sz="1200" dirty="0"/>
+                </a:p>
+              </p:txBody>
+            </p:sp>
+          </p:grpSp>
+          <p:grpSp>
+            <p:nvGrpSpPr>
+              <p:cNvPr id="34" name="그룹 33">
+                <a:extLst>
+                  <a:ext uri="{FF2B5EF4-FFF2-40B4-BE49-F238E27FC236}">
+                    <a16:creationId xmlns:a16="http://schemas.microsoft.com/office/drawing/2014/main" id="{73228217-1198-4288-982F-FBEC09E124C6}"/>
+                  </a:ext>
+                </a:extLst>
+              </p:cNvPr>
+              <p:cNvGrpSpPr/>
+              <p:nvPr/>
+            </p:nvGrpSpPr>
+            <p:grpSpPr>
+              <a:xfrm>
+                <a:off x="5406302" y="2368189"/>
+                <a:ext cx="3474787" cy="1060811"/>
+                <a:chOff x="5406303" y="3056116"/>
+                <a:chExt cx="3474787" cy="1060811"/>
+              </a:xfrm>
+            </p:grpSpPr>
+            <p:cxnSp>
+              <p:nvCxnSpPr>
+                <p:cNvPr id="35" name="연결선: 꺾임 34">
+                  <a:extLst>
+                    <a:ext uri="{FF2B5EF4-FFF2-40B4-BE49-F238E27FC236}">
+                      <a16:creationId xmlns:a16="http://schemas.microsoft.com/office/drawing/2014/main" id="{8B99AB5A-84A2-495A-8F6B-A612CB624BF3}"/>
+                    </a:ext>
+                  </a:extLst>
+                </p:cNvPr>
+                <p:cNvCxnSpPr>
+                  <a:cxnSpLocks/>
+                </p:cNvCxnSpPr>
+                <p:nvPr/>
+              </p:nvCxnSpPr>
+              <p:spPr>
+                <a:xfrm flipV="1">
+                  <a:off x="5406303" y="3188214"/>
+                  <a:ext cx="3128811" cy="928713"/>
+                </a:xfrm>
+                <a:prstGeom prst="bentConnector3">
+                  <a:avLst>
+                    <a:gd name="adj1" fmla="val 145"/>
+                  </a:avLst>
+                </a:prstGeom>
+                <a:ln w="19050">
+                  <a:solidFill>
+                    <a:schemeClr val="tx1"/>
+                  </a:solidFill>
+                  <a:headEnd type="triangle"/>
+                  <a:tailEnd type="none"/>
+                </a:ln>
+              </p:spPr>
+              <p:style>
+                <a:lnRef idx="1">
+                  <a:schemeClr val="accent1"/>
+                </a:lnRef>
+                <a:fillRef idx="0">
+                  <a:schemeClr val="accent1"/>
+                </a:fillRef>
+                <a:effectRef idx="0">
+                  <a:schemeClr val="accent1"/>
+                </a:effectRef>
+                <a:fontRef idx="minor">
+                  <a:schemeClr val="tx1"/>
+                </a:fontRef>
+              </p:style>
+            </p:cxnSp>
+            <p:sp>
+              <p:nvSpPr>
+                <p:cNvPr id="36" name="TextBox 35">
+                  <a:extLst>
+                    <a:ext uri="{FF2B5EF4-FFF2-40B4-BE49-F238E27FC236}">
+                      <a16:creationId xmlns:a16="http://schemas.microsoft.com/office/drawing/2014/main" id="{4448F761-C2CB-4D84-867E-AC0E3EB620E0}"/>
+                    </a:ext>
+                  </a:extLst>
+                </p:cNvPr>
+                <p:cNvSpPr txBox="1"/>
+                <p:nvPr/>
+              </p:nvSpPr>
+              <p:spPr>
+                <a:xfrm>
+                  <a:off x="8535115" y="3056116"/>
+                  <a:ext cx="345975" cy="189671"/>
+                </a:xfrm>
+                <a:prstGeom prst="rect">
+                  <a:avLst/>
+                </a:prstGeom>
+                <a:noFill/>
+              </p:spPr>
+              <p:txBody>
+                <a:bodyPr wrap="none" rtlCol="0">
+                  <a:spAutoFit/>
+                </a:bodyPr>
+                <a:lstStyle/>
+                <a:p>
+                  <a:r>
+                    <a:rPr lang="en-US" altLang="ko-KR" sz="1200" dirty="0"/>
+                    <a:t>btn1</a:t>
+                  </a:r>
+                  <a:endParaRPr lang="ko-KR" altLang="en-US" sz="1200" dirty="0"/>
+                </a:p>
+              </p:txBody>
+            </p:sp>
+          </p:grpSp>
+        </p:grpSp>
+        <p:cxnSp>
+          <p:nvCxnSpPr>
+            <p:cNvPr id="37" name="직선 화살표 연결선 36">
+              <a:extLst>
+                <a:ext uri="{FF2B5EF4-FFF2-40B4-BE49-F238E27FC236}">
+                  <a16:creationId xmlns:a16="http://schemas.microsoft.com/office/drawing/2014/main" id="{80C60D18-F0CF-4E2C-AB47-EFCA00DE5AAD}"/>
+                </a:ext>
+              </a:extLst>
+            </p:cNvPr>
+            <p:cNvCxnSpPr/>
+            <p:nvPr/>
+          </p:nvCxnSpPr>
+          <p:spPr>
+            <a:xfrm flipH="1">
+              <a:off x="2070061" y="4071623"/>
+              <a:ext cx="2385575" cy="0"/>
+            </a:xfrm>
+            <a:prstGeom prst="straightConnector1">
+              <a:avLst/>
+            </a:prstGeom>
+            <a:ln w="57150">
+              <a:solidFill>
+                <a:schemeClr val="tx1"/>
+              </a:solidFill>
+              <a:tailEnd type="triangle"/>
+            </a:ln>
+          </p:spPr>
+          <p:style>
+            <a:lnRef idx="1">
+              <a:schemeClr val="accent1"/>
+            </a:lnRef>
+            <a:fillRef idx="0">
+              <a:schemeClr val="accent1"/>
+            </a:fillRef>
+            <a:effectRef idx="0">
+              <a:schemeClr val="accent1"/>
+            </a:effectRef>
+            <a:fontRef idx="minor">
+              <a:schemeClr val="tx1"/>
+            </a:fontRef>
+          </p:style>
+        </p:cxnSp>
+        <p:sp>
+          <p:nvSpPr>
+            <p:cNvPr id="38" name="TextBox 37">
+              <a:extLst>
+                <a:ext uri="{FF2B5EF4-FFF2-40B4-BE49-F238E27FC236}">
+                  <a16:creationId xmlns:a16="http://schemas.microsoft.com/office/drawing/2014/main" id="{F9E11AC1-EA6D-4C39-9023-C23D4F47D8D7}"/>
+                </a:ext>
+              </a:extLst>
+            </p:cNvPr>
+            <p:cNvSpPr txBox="1"/>
+            <p:nvPr/>
+          </p:nvSpPr>
+          <p:spPr>
+            <a:xfrm>
+              <a:off x="807765" y="3869357"/>
+              <a:ext cx="1262295" cy="276999"/>
+            </a:xfrm>
+            <a:prstGeom prst="rect">
+              <a:avLst/>
+            </a:prstGeom>
+            <a:noFill/>
+          </p:spPr>
+          <p:txBody>
+            <a:bodyPr wrap="square" rtlCol="0">
+              <a:spAutoFit/>
+            </a:bodyPr>
+            <a:lstStyle/>
+            <a:p>
+              <a:r>
+                <a:rPr lang="en-US" altLang="ko-KR" sz="1200" dirty="0"/>
+                <a:t>score[1:0]</a:t>
+              </a:r>
+              <a:endParaRPr lang="ko-KR" altLang="en-US" sz="1200" dirty="0"/>
+            </a:p>
+          </p:txBody>
+        </p:sp>
+        <p:cxnSp>
+          <p:nvCxnSpPr>
+            <p:cNvPr id="39" name="직선 연결선 38">
+              <a:extLst>
+                <a:ext uri="{FF2B5EF4-FFF2-40B4-BE49-F238E27FC236}">
+                  <a16:creationId xmlns:a16="http://schemas.microsoft.com/office/drawing/2014/main" id="{FCEB1D9A-04F5-4B47-9C54-C08342611307}"/>
+                </a:ext>
+              </a:extLst>
+            </p:cNvPr>
+            <p:cNvCxnSpPr>
+              <a:cxnSpLocks/>
+            </p:cNvCxnSpPr>
+            <p:nvPr/>
+          </p:nvCxnSpPr>
+          <p:spPr>
+            <a:xfrm flipH="1">
+              <a:off x="3176850" y="3926581"/>
+              <a:ext cx="135229" cy="271826"/>
+            </a:xfrm>
+            <a:prstGeom prst="line">
+              <a:avLst/>
+            </a:prstGeom>
+            <a:ln w="19050">
+              <a:solidFill>
+                <a:schemeClr val="tx1"/>
+              </a:solidFill>
+            </a:ln>
+          </p:spPr>
+          <p:style>
+            <a:lnRef idx="1">
+              <a:schemeClr val="accent1"/>
+            </a:lnRef>
+            <a:fillRef idx="0">
+              <a:schemeClr val="accent1"/>
+            </a:fillRef>
+            <a:effectRef idx="0">
+              <a:schemeClr val="accent1"/>
+            </a:effectRef>
+            <a:fontRef idx="minor">
+              <a:schemeClr val="tx1"/>
+            </a:fontRef>
+          </p:style>
+        </p:cxnSp>
+        <p:cxnSp>
+          <p:nvCxnSpPr>
+            <p:cNvPr id="40" name="연결선: 꺾임 39">
+              <a:extLst>
+                <a:ext uri="{FF2B5EF4-FFF2-40B4-BE49-F238E27FC236}">
+                  <a16:creationId xmlns:a16="http://schemas.microsoft.com/office/drawing/2014/main" id="{698534EE-B849-4E71-80D2-87115C4380DF}"/>
+                </a:ext>
+              </a:extLst>
+            </p:cNvPr>
+            <p:cNvCxnSpPr>
+              <a:cxnSpLocks/>
+              <a:endCxn id="41" idx="1"/>
+            </p:cNvCxnSpPr>
+            <p:nvPr/>
+          </p:nvCxnSpPr>
+          <p:spPr>
+            <a:xfrm>
+              <a:off x="4678050" y="4232230"/>
+              <a:ext cx="4993552" cy="530156"/>
+            </a:xfrm>
+            <a:prstGeom prst="bentConnector3">
+              <a:avLst>
+                <a:gd name="adj1" fmla="val 92"/>
+              </a:avLst>
+            </a:prstGeom>
+            <a:ln w="19050">
+              <a:solidFill>
+                <a:schemeClr val="tx1"/>
+              </a:solidFill>
+              <a:headEnd type="triangle"/>
+              <a:tailEnd type="none"/>
+            </a:ln>
+          </p:spPr>
+          <p:style>
+            <a:lnRef idx="1">
+              <a:schemeClr val="accent1"/>
+            </a:lnRef>
+            <a:fillRef idx="0">
+              <a:schemeClr val="accent1"/>
+            </a:fillRef>
+            <a:effectRef idx="0">
+              <a:schemeClr val="accent1"/>
+            </a:effectRef>
+            <a:fontRef idx="minor">
+              <a:schemeClr val="tx1"/>
+            </a:fontRef>
+          </p:style>
+        </p:cxnSp>
+        <p:sp>
+          <p:nvSpPr>
+            <p:cNvPr id="41" name="TextBox 40">
+              <a:extLst>
+                <a:ext uri="{FF2B5EF4-FFF2-40B4-BE49-F238E27FC236}">
+                  <a16:creationId xmlns:a16="http://schemas.microsoft.com/office/drawing/2014/main" id="{29304377-934D-4F53-8E28-1DA9683E4B81}"/>
+                </a:ext>
+              </a:extLst>
+            </p:cNvPr>
+            <p:cNvSpPr txBox="1"/>
+            <p:nvPr/>
+          </p:nvSpPr>
+          <p:spPr>
+            <a:xfrm>
+              <a:off x="9671602" y="4623886"/>
+              <a:ext cx="439544" cy="276999"/>
+            </a:xfrm>
+            <a:prstGeom prst="rect">
+              <a:avLst/>
+            </a:prstGeom>
+            <a:noFill/>
+          </p:spPr>
+          <p:txBody>
+            <a:bodyPr wrap="none" rtlCol="0">
+              <a:spAutoFit/>
+            </a:bodyPr>
+            <a:lstStyle/>
+            <a:p>
+              <a:r>
+                <a:rPr lang="en-US" altLang="ko-KR" sz="1200" dirty="0" err="1"/>
+                <a:t>nclr</a:t>
+              </a:r>
+              <a:endParaRPr lang="ko-KR" altLang="en-US" sz="1200" dirty="0"/>
+            </a:p>
+          </p:txBody>
+        </p:sp>
+      </p:grpSp>
+    </p:spTree>
+    <p:extLst>
+      <p:ext uri="{BB962C8B-B14F-4D97-AF65-F5344CB8AC3E}">
+        <p14:creationId xmlns:p14="http://schemas.microsoft.com/office/powerpoint/2010/main" val="3428621597"/>
+      </p:ext>
+    </p:extLst>
+  </p:cSld>
+  <p:clrMapOvr>
+    <a:masterClrMapping/>
+  </p:clrMapOvr>
+</p:sld>
+</file>
+
 <file path=ppt/theme/theme1.xml><?xml version="1.0" encoding="utf-8"?>
 <a:theme xmlns:a="http://schemas.openxmlformats.org/drawingml/2006/main" name="Office 테마">
   <a:themeElements>

</xml_diff>